<commit_message>
Added control flow while loop slideshow to book
</commit_message>
<xml_diff>
--- a/resources/ppt-slides/control-flow-while-loop.pptx
+++ b/resources/ppt-slides/control-flow-while-loop.pptx
@@ -4451,7 +4451,7 @@
             </p:nvCxnSpPr>
             <p:spPr>
               <a:xfrm flipV="1">
-                <a:off x="5227292" y="5193905"/>
+                <a:off x="5227292" y="5229249"/>
                 <a:ext cx="0" cy="190856"/>
               </a:xfrm>
               <a:prstGeom prst="line">
@@ -4849,23 +4849,23 @@
               <a:custGeom>
                 <a:avLst/>
                 <a:gdLst>
-                  <a:gd name="connsiteX0" fmla="*/ 0 w 1450791"/>
+                  <a:gd name="connsiteX0" fmla="*/ 0 w 1687408"/>
                   <a:gd name="connsiteY0" fmla="*/ 0 h 307777"/>
-                  <a:gd name="connsiteX1" fmla="*/ 469089 w 1450791"/>
+                  <a:gd name="connsiteX1" fmla="*/ 545595 w 1687408"/>
                   <a:gd name="connsiteY1" fmla="*/ 0 h 307777"/>
-                  <a:gd name="connsiteX2" fmla="*/ 909162 w 1450791"/>
+                  <a:gd name="connsiteX2" fmla="*/ 1057442 w 1687408"/>
                   <a:gd name="connsiteY2" fmla="*/ 0 h 307777"/>
-                  <a:gd name="connsiteX3" fmla="*/ 1450791 w 1450791"/>
+                  <a:gd name="connsiteX3" fmla="*/ 1687408 w 1687408"/>
                   <a:gd name="connsiteY3" fmla="*/ 0 h 307777"/>
-                  <a:gd name="connsiteX4" fmla="*/ 1450791 w 1450791"/>
+                  <a:gd name="connsiteX4" fmla="*/ 1687408 w 1687408"/>
                   <a:gd name="connsiteY4" fmla="*/ 307777 h 307777"/>
-                  <a:gd name="connsiteX5" fmla="*/ 996210 w 1450791"/>
+                  <a:gd name="connsiteX5" fmla="*/ 1158687 w 1687408"/>
                   <a:gd name="connsiteY5" fmla="*/ 307777 h 307777"/>
-                  <a:gd name="connsiteX6" fmla="*/ 483597 w 1450791"/>
+                  <a:gd name="connsiteX6" fmla="*/ 562469 w 1687408"/>
                   <a:gd name="connsiteY6" fmla="*/ 307777 h 307777"/>
-                  <a:gd name="connsiteX7" fmla="*/ 0 w 1450791"/>
+                  <a:gd name="connsiteX7" fmla="*/ 0 w 1687408"/>
                   <a:gd name="connsiteY7" fmla="*/ 307777 h 307777"/>
-                  <a:gd name="connsiteX8" fmla="*/ 0 w 1450791"/>
+                  <a:gd name="connsiteX8" fmla="*/ 0 w 1687408"/>
                   <a:gd name="connsiteY8" fmla="*/ 0 h 307777"/>
                 </a:gdLst>
                 <a:ahLst/>
@@ -4900,43 +4900,43 @@
                 </a:cxnLst>
                 <a:rect l="l" t="t" r="r" b="b"/>
                 <a:pathLst>
-                  <a:path w="1450791" h="307777" extrusionOk="0">
+                  <a:path w="1687408" h="307777" extrusionOk="0">
                     <a:moveTo>
                       <a:pt x="0" y="0"/>
                     </a:moveTo>
                     <a:cubicBezTo>
-                      <a:pt x="150675" y="-4249"/>
-                      <a:pt x="352734" y="-14730"/>
-                      <a:pt x="469089" y="0"/>
-                    </a:cubicBezTo>
-                    <a:cubicBezTo>
-                      <a:pt x="585444" y="14730"/>
-                      <a:pt x="789481" y="20990"/>
-                      <a:pt x="909162" y="0"/>
-                    </a:cubicBezTo>
-                    <a:cubicBezTo>
-                      <a:pt x="1028843" y="-20990"/>
-                      <a:pt x="1242402" y="2768"/>
-                      <a:pt x="1450791" y="0"/>
-                    </a:cubicBezTo>
-                    <a:cubicBezTo>
-                      <a:pt x="1456229" y="133970"/>
-                      <a:pt x="1446634" y="197125"/>
-                      <a:pt x="1450791" y="307777"/>
-                    </a:cubicBezTo>
-                    <a:cubicBezTo>
-                      <a:pt x="1333195" y="294757"/>
-                      <a:pt x="1100499" y="330196"/>
-                      <a:pt x="996210" y="307777"/>
-                    </a:cubicBezTo>
-                    <a:cubicBezTo>
-                      <a:pt x="891921" y="285358"/>
-                      <a:pt x="589493" y="289357"/>
-                      <a:pt x="483597" y="307777"/>
-                    </a:cubicBezTo>
-                    <a:cubicBezTo>
-                      <a:pt x="377701" y="326197"/>
-                      <a:pt x="104073" y="295228"/>
+                      <a:pt x="128936" y="6660"/>
+                      <a:pt x="319593" y="-22133"/>
+                      <a:pt x="545595" y="0"/>
+                    </a:cubicBezTo>
+                    <a:cubicBezTo>
+                      <a:pt x="771597" y="22133"/>
+                      <a:pt x="809002" y="-23071"/>
+                      <a:pt x="1057442" y="0"/>
+                    </a:cubicBezTo>
+                    <a:cubicBezTo>
+                      <a:pt x="1305882" y="23071"/>
+                      <a:pt x="1451336" y="-20848"/>
+                      <a:pt x="1687408" y="0"/>
+                    </a:cubicBezTo>
+                    <a:cubicBezTo>
+                      <a:pt x="1692846" y="133970"/>
+                      <a:pt x="1683251" y="197125"/>
+                      <a:pt x="1687408" y="307777"/>
+                    </a:cubicBezTo>
+                    <a:cubicBezTo>
+                      <a:pt x="1482592" y="292155"/>
+                      <a:pt x="1308745" y="293224"/>
+                      <a:pt x="1158687" y="307777"/>
+                    </a:cubicBezTo>
+                    <a:cubicBezTo>
+                      <a:pt x="1008629" y="322330"/>
+                      <a:pt x="799311" y="298125"/>
+                      <a:pt x="562469" y="307777"/>
+                    </a:cubicBezTo>
+                    <a:cubicBezTo>
+                      <a:pt x="325627" y="317429"/>
+                      <a:pt x="126178" y="279914"/>
                       <a:pt x="0" y="307777"/>
                     </a:cubicBezTo>
                     <a:cubicBezTo>
@@ -8416,47 +8416,6 @@
           </p:txBody>
         </p:sp>
       </p:grpSp>
-      <p:sp>
-        <p:nvSpPr>
-          <p:cNvPr id="9" name="TextBox 8">
-            <a:extLst>
-              <a:ext uri="{FF2B5EF4-FFF2-40B4-BE49-F238E27FC236}">
-                <a16:creationId xmlns:a16="http://schemas.microsoft.com/office/drawing/2014/main" id="{986240EA-171D-8D23-EB6E-59C6FEBC0D54}"/>
-              </a:ext>
-            </a:extLst>
-          </p:cNvPr>
-          <p:cNvSpPr txBox="1"/>
-          <p:nvPr/>
-        </p:nvSpPr>
-        <p:spPr>
-          <a:xfrm>
-            <a:off x="3346797" y="4021573"/>
-            <a:ext cx="543099" cy="369332"/>
-          </a:xfrm>
-          <a:prstGeom prst="rect">
-            <a:avLst/>
-          </a:prstGeom>
-          <a:noFill/>
-        </p:spPr>
-        <p:txBody>
-          <a:bodyPr wrap="square" rtlCol="0">
-            <a:spAutoFit/>
-          </a:bodyPr>
-          <a:lstStyle/>
-          <a:p>
-            <a:r>
-              <a:rPr lang="en-US" dirty="0">
-                <a:solidFill>
-                  <a:schemeClr val="bg1">
-                    <a:lumMod val="65000"/>
-                  </a:schemeClr>
-                </a:solidFill>
-              </a:rPr>
-              <a:t>8</a:t>
-            </a:r>
-          </a:p>
-        </p:txBody>
-      </p:sp>
       <p:grpSp>
         <p:nvGrpSpPr>
           <p:cNvPr id="28" name="Group 27">
@@ -8866,47 +8825,6 @@
       </p:sp>
       <p:sp>
         <p:nvSpPr>
-          <p:cNvPr id="68" name="TextBox 67">
-            <a:extLst>
-              <a:ext uri="{FF2B5EF4-FFF2-40B4-BE49-F238E27FC236}">
-                <a16:creationId xmlns:a16="http://schemas.microsoft.com/office/drawing/2014/main" id="{B89EA0DE-1E59-B39C-A571-F622049B6F3C}"/>
-              </a:ext>
-            </a:extLst>
-          </p:cNvPr>
-          <p:cNvSpPr txBox="1"/>
-          <p:nvPr/>
-        </p:nvSpPr>
-        <p:spPr>
-          <a:xfrm>
-            <a:off x="3345192" y="4250978"/>
-            <a:ext cx="543099" cy="369332"/>
-          </a:xfrm>
-          <a:prstGeom prst="rect">
-            <a:avLst/>
-          </a:prstGeom>
-          <a:noFill/>
-        </p:spPr>
-        <p:txBody>
-          <a:bodyPr wrap="square" rtlCol="0">
-            <a:spAutoFit/>
-          </a:bodyPr>
-          <a:lstStyle/>
-          <a:p>
-            <a:r>
-              <a:rPr lang="en-US" dirty="0">
-                <a:solidFill>
-                  <a:schemeClr val="bg1">
-                    <a:lumMod val="65000"/>
-                  </a:schemeClr>
-                </a:solidFill>
-              </a:rPr>
-              <a:t>9</a:t>
-            </a:r>
-          </a:p>
-        </p:txBody>
-      </p:sp>
-      <p:sp>
-        <p:nvSpPr>
           <p:cNvPr id="49" name="Rectangle 48">
             <a:extLst>
               <a:ext uri="{FF2B5EF4-FFF2-40B4-BE49-F238E27FC236}">
@@ -9193,49 +9111,8 @@
         </p:nvSpPr>
         <p:spPr>
           <a:xfrm>
-            <a:off x="3345192" y="3557955"/>
-            <a:ext cx="543099" cy="369332"/>
-          </a:xfrm>
-          <a:prstGeom prst="rect">
-            <a:avLst/>
-          </a:prstGeom>
-          <a:noFill/>
-        </p:spPr>
-        <p:txBody>
-          <a:bodyPr wrap="square" rtlCol="0">
-            <a:spAutoFit/>
-          </a:bodyPr>
-          <a:lstStyle/>
-          <a:p>
-            <a:r>
-              <a:rPr lang="en-US" dirty="0">
-                <a:solidFill>
-                  <a:schemeClr val="bg1">
-                    <a:lumMod val="65000"/>
-                  </a:schemeClr>
-                </a:solidFill>
-              </a:rPr>
-              <a:t>6</a:t>
-            </a:r>
-          </a:p>
-        </p:txBody>
-      </p:sp>
-      <p:sp>
-        <p:nvSpPr>
-          <p:cNvPr id="70" name="TextBox 69">
-            <a:extLst>
-              <a:ext uri="{FF2B5EF4-FFF2-40B4-BE49-F238E27FC236}">
-                <a16:creationId xmlns:a16="http://schemas.microsoft.com/office/drawing/2014/main" id="{3604D5DF-FCAD-A58F-2421-3BA9E4065F1D}"/>
-              </a:ext>
-            </a:extLst>
-          </p:cNvPr>
-          <p:cNvSpPr txBox="1"/>
-          <p:nvPr/>
-        </p:nvSpPr>
-        <p:spPr>
-          <a:xfrm>
-            <a:off x="3343587" y="3796985"/>
-            <a:ext cx="543099" cy="369332"/>
+            <a:off x="3335567" y="3596455"/>
+            <a:ext cx="543099" cy="923330"/>
           </a:xfrm>
           <a:prstGeom prst="rect">
             <a:avLst/>
@@ -9259,8 +9136,77 @@
               <a:t>7</a:t>
             </a:r>
           </a:p>
+          <a:p>
+            <a:r>
+              <a:rPr lang="en-US" dirty="0">
+                <a:solidFill>
+                  <a:schemeClr val="bg1">
+                    <a:lumMod val="65000"/>
+                  </a:schemeClr>
+                </a:solidFill>
+              </a:rPr>
+              <a:t>8</a:t>
+            </a:r>
+          </a:p>
+          <a:p>
+            <a:r>
+              <a:rPr lang="en-US" dirty="0">
+                <a:solidFill>
+                  <a:schemeClr val="bg1">
+                    <a:lumMod val="65000"/>
+                  </a:schemeClr>
+                </a:solidFill>
+              </a:rPr>
+              <a:t>9</a:t>
+            </a:r>
+          </a:p>
         </p:txBody>
       </p:sp>
+      <p:cxnSp>
+        <p:nvCxnSpPr>
+          <p:cNvPr id="4" name="Straight Connector 3">
+            <a:extLst>
+              <a:ext uri="{FF2B5EF4-FFF2-40B4-BE49-F238E27FC236}">
+                <a16:creationId xmlns:a16="http://schemas.microsoft.com/office/drawing/2014/main" id="{2358FC77-C260-883E-F4E4-F9299BA7DED3}"/>
+              </a:ext>
+            </a:extLst>
+          </p:cNvPr>
+          <p:cNvCxnSpPr>
+            <a:cxnSpLocks/>
+          </p:cNvCxnSpPr>
+          <p:nvPr/>
+        </p:nvCxnSpPr>
+        <p:spPr>
+          <a:xfrm flipV="1">
+            <a:off x="3473510" y="4529524"/>
+            <a:ext cx="0" cy="155924"/>
+          </a:xfrm>
+          <a:prstGeom prst="line">
+            <a:avLst/>
+          </a:prstGeom>
+          <a:ln w="25400">
+            <a:solidFill>
+              <a:schemeClr val="bg1">
+                <a:lumMod val="65000"/>
+              </a:schemeClr>
+            </a:solidFill>
+          </a:ln>
+        </p:spPr>
+        <p:style>
+          <a:lnRef idx="1">
+            <a:schemeClr val="accent1"/>
+          </a:lnRef>
+          <a:fillRef idx="0">
+            <a:schemeClr val="accent1"/>
+          </a:fillRef>
+          <a:effectRef idx="0">
+            <a:schemeClr val="accent1"/>
+          </a:effectRef>
+          <a:fontRef idx="minor">
+            <a:schemeClr val="tx1"/>
+          </a:fontRef>
+        </p:style>
+      </p:cxnSp>
     </p:spTree>
     <p:extLst>
       <p:ext uri="{BB962C8B-B14F-4D97-AF65-F5344CB8AC3E}">
@@ -12044,170 +11990,6 @@
           </a:p>
         </p:txBody>
       </p:sp>
-      <p:sp>
-        <p:nvSpPr>
-          <p:cNvPr id="90" name="TextBox 89">
-            <a:extLst>
-              <a:ext uri="{FF2B5EF4-FFF2-40B4-BE49-F238E27FC236}">
-                <a16:creationId xmlns:a16="http://schemas.microsoft.com/office/drawing/2014/main" id="{065FCE51-7A11-F65A-1AAB-0D76E6CFDA52}"/>
-              </a:ext>
-            </a:extLst>
-          </p:cNvPr>
-          <p:cNvSpPr txBox="1"/>
-          <p:nvPr/>
-        </p:nvSpPr>
-        <p:spPr>
-          <a:xfrm>
-            <a:off x="3346797" y="4021573"/>
-            <a:ext cx="543099" cy="369332"/>
-          </a:xfrm>
-          <a:prstGeom prst="rect">
-            <a:avLst/>
-          </a:prstGeom>
-          <a:noFill/>
-        </p:spPr>
-        <p:txBody>
-          <a:bodyPr wrap="square" rtlCol="0">
-            <a:spAutoFit/>
-          </a:bodyPr>
-          <a:lstStyle/>
-          <a:p>
-            <a:r>
-              <a:rPr lang="en-US" dirty="0">
-                <a:solidFill>
-                  <a:schemeClr val="bg1">
-                    <a:lumMod val="65000"/>
-                  </a:schemeClr>
-                </a:solidFill>
-              </a:rPr>
-              <a:t>8</a:t>
-            </a:r>
-          </a:p>
-        </p:txBody>
-      </p:sp>
-      <p:sp>
-        <p:nvSpPr>
-          <p:cNvPr id="91" name="TextBox 90">
-            <a:extLst>
-              <a:ext uri="{FF2B5EF4-FFF2-40B4-BE49-F238E27FC236}">
-                <a16:creationId xmlns:a16="http://schemas.microsoft.com/office/drawing/2014/main" id="{5721A2AF-A42F-9D5D-911B-748DE156A3D0}"/>
-              </a:ext>
-            </a:extLst>
-          </p:cNvPr>
-          <p:cNvSpPr txBox="1"/>
-          <p:nvPr/>
-        </p:nvSpPr>
-        <p:spPr>
-          <a:xfrm>
-            <a:off x="3345192" y="4250978"/>
-            <a:ext cx="543099" cy="369332"/>
-          </a:xfrm>
-          <a:prstGeom prst="rect">
-            <a:avLst/>
-          </a:prstGeom>
-          <a:noFill/>
-        </p:spPr>
-        <p:txBody>
-          <a:bodyPr wrap="square" rtlCol="0">
-            <a:spAutoFit/>
-          </a:bodyPr>
-          <a:lstStyle/>
-          <a:p>
-            <a:r>
-              <a:rPr lang="en-US" dirty="0">
-                <a:solidFill>
-                  <a:schemeClr val="bg1">
-                    <a:lumMod val="65000"/>
-                  </a:schemeClr>
-                </a:solidFill>
-              </a:rPr>
-              <a:t>9</a:t>
-            </a:r>
-          </a:p>
-        </p:txBody>
-      </p:sp>
-      <p:sp>
-        <p:nvSpPr>
-          <p:cNvPr id="92" name="TextBox 91">
-            <a:extLst>
-              <a:ext uri="{FF2B5EF4-FFF2-40B4-BE49-F238E27FC236}">
-                <a16:creationId xmlns:a16="http://schemas.microsoft.com/office/drawing/2014/main" id="{82C235A5-CA78-45F3-9D38-20897F5AE17F}"/>
-              </a:ext>
-            </a:extLst>
-          </p:cNvPr>
-          <p:cNvSpPr txBox="1"/>
-          <p:nvPr/>
-        </p:nvSpPr>
-        <p:spPr>
-          <a:xfrm>
-            <a:off x="3345192" y="3557955"/>
-            <a:ext cx="543099" cy="369332"/>
-          </a:xfrm>
-          <a:prstGeom prst="rect">
-            <a:avLst/>
-          </a:prstGeom>
-          <a:noFill/>
-        </p:spPr>
-        <p:txBody>
-          <a:bodyPr wrap="square" rtlCol="0">
-            <a:spAutoFit/>
-          </a:bodyPr>
-          <a:lstStyle/>
-          <a:p>
-            <a:r>
-              <a:rPr lang="en-US" dirty="0">
-                <a:solidFill>
-                  <a:schemeClr val="bg1">
-                    <a:lumMod val="65000"/>
-                  </a:schemeClr>
-                </a:solidFill>
-              </a:rPr>
-              <a:t>6</a:t>
-            </a:r>
-          </a:p>
-        </p:txBody>
-      </p:sp>
-      <p:sp>
-        <p:nvSpPr>
-          <p:cNvPr id="93" name="TextBox 92">
-            <a:extLst>
-              <a:ext uri="{FF2B5EF4-FFF2-40B4-BE49-F238E27FC236}">
-                <a16:creationId xmlns:a16="http://schemas.microsoft.com/office/drawing/2014/main" id="{A3AF90BD-7F71-F1D9-11B9-EA201CFC1BB3}"/>
-              </a:ext>
-            </a:extLst>
-          </p:cNvPr>
-          <p:cNvSpPr txBox="1"/>
-          <p:nvPr/>
-        </p:nvSpPr>
-        <p:spPr>
-          <a:xfrm>
-            <a:off x="3343587" y="3796985"/>
-            <a:ext cx="543099" cy="369332"/>
-          </a:xfrm>
-          <a:prstGeom prst="rect">
-            <a:avLst/>
-          </a:prstGeom>
-          <a:noFill/>
-        </p:spPr>
-        <p:txBody>
-          <a:bodyPr wrap="square" rtlCol="0">
-            <a:spAutoFit/>
-          </a:bodyPr>
-          <a:lstStyle/>
-          <a:p>
-            <a:r>
-              <a:rPr lang="en-US" dirty="0">
-                <a:solidFill>
-                  <a:schemeClr val="bg1">
-                    <a:lumMod val="65000"/>
-                  </a:schemeClr>
-                </a:solidFill>
-              </a:rPr>
-              <a:t>7</a:t>
-            </a:r>
-          </a:p>
-        </p:txBody>
-      </p:sp>
       <p:cxnSp>
         <p:nvCxnSpPr>
           <p:cNvPr id="94" name="Straight Connector 93">
@@ -12224,7 +12006,7 @@
         </p:nvCxnSpPr>
         <p:spPr>
           <a:xfrm flipV="1">
-            <a:off x="3473510" y="4587274"/>
+            <a:off x="3473510" y="4529524"/>
             <a:ext cx="0" cy="155924"/>
           </a:xfrm>
           <a:prstGeom prst="line">
@@ -12253,6 +12035,71 @@
           </a:fontRef>
         </p:style>
       </p:cxnSp>
+      <p:sp>
+        <p:nvSpPr>
+          <p:cNvPr id="7" name="TextBox 6">
+            <a:extLst>
+              <a:ext uri="{FF2B5EF4-FFF2-40B4-BE49-F238E27FC236}">
+                <a16:creationId xmlns:a16="http://schemas.microsoft.com/office/drawing/2014/main" id="{489C891D-8B47-9F44-FF50-8DBA988D01C2}"/>
+              </a:ext>
+            </a:extLst>
+          </p:cNvPr>
+          <p:cNvSpPr txBox="1"/>
+          <p:nvPr/>
+        </p:nvSpPr>
+        <p:spPr>
+          <a:xfrm>
+            <a:off x="3335567" y="3596455"/>
+            <a:ext cx="543099" cy="923330"/>
+          </a:xfrm>
+          <a:prstGeom prst="rect">
+            <a:avLst/>
+          </a:prstGeom>
+          <a:noFill/>
+        </p:spPr>
+        <p:txBody>
+          <a:bodyPr wrap="square" rtlCol="0">
+            <a:spAutoFit/>
+          </a:bodyPr>
+          <a:lstStyle/>
+          <a:p>
+            <a:r>
+              <a:rPr lang="en-US" dirty="0">
+                <a:solidFill>
+                  <a:schemeClr val="bg1">
+                    <a:lumMod val="65000"/>
+                  </a:schemeClr>
+                </a:solidFill>
+              </a:rPr>
+              <a:t>7</a:t>
+            </a:r>
+          </a:p>
+          <a:p>
+            <a:r>
+              <a:rPr lang="en-US" dirty="0">
+                <a:solidFill>
+                  <a:schemeClr val="bg1">
+                    <a:lumMod val="65000"/>
+                  </a:schemeClr>
+                </a:solidFill>
+              </a:rPr>
+              <a:t>8</a:t>
+            </a:r>
+          </a:p>
+          <a:p>
+            <a:r>
+              <a:rPr lang="en-US" dirty="0">
+                <a:solidFill>
+                  <a:schemeClr val="bg1">
+                    <a:lumMod val="65000"/>
+                  </a:schemeClr>
+                </a:solidFill>
+              </a:rPr>
+              <a:t>9</a:t>
+            </a:r>
+          </a:p>
+        </p:txBody>
+      </p:sp>
     </p:spTree>
     <p:extLst>
       <p:ext uri="{BB962C8B-B14F-4D97-AF65-F5344CB8AC3E}">
@@ -13724,7 +13571,7 @@
             </p:nvCxnSpPr>
             <p:spPr>
               <a:xfrm flipV="1">
-                <a:off x="5227292" y="5193905"/>
+                <a:off x="5227292" y="5229249"/>
                 <a:ext cx="0" cy="190856"/>
               </a:xfrm>
               <a:prstGeom prst="line">
@@ -14998,23 +14845,23 @@
             <a:custGeom>
               <a:avLst/>
               <a:gdLst>
-                <a:gd name="connsiteX0" fmla="*/ 0 w 1687408"/>
+                <a:gd name="connsiteX0" fmla="*/ 0 w 1450791"/>
                 <a:gd name="connsiteY0" fmla="*/ 0 h 307777"/>
-                <a:gd name="connsiteX1" fmla="*/ 545595 w 1687408"/>
+                <a:gd name="connsiteX1" fmla="*/ 469089 w 1450791"/>
                 <a:gd name="connsiteY1" fmla="*/ 0 h 307777"/>
-                <a:gd name="connsiteX2" fmla="*/ 1057442 w 1687408"/>
+                <a:gd name="connsiteX2" fmla="*/ 909162 w 1450791"/>
                 <a:gd name="connsiteY2" fmla="*/ 0 h 307777"/>
-                <a:gd name="connsiteX3" fmla="*/ 1687408 w 1687408"/>
+                <a:gd name="connsiteX3" fmla="*/ 1450791 w 1450791"/>
                 <a:gd name="connsiteY3" fmla="*/ 0 h 307777"/>
-                <a:gd name="connsiteX4" fmla="*/ 1687408 w 1687408"/>
+                <a:gd name="connsiteX4" fmla="*/ 1450791 w 1450791"/>
                 <a:gd name="connsiteY4" fmla="*/ 307777 h 307777"/>
-                <a:gd name="connsiteX5" fmla="*/ 1158687 w 1687408"/>
+                <a:gd name="connsiteX5" fmla="*/ 996210 w 1450791"/>
                 <a:gd name="connsiteY5" fmla="*/ 307777 h 307777"/>
-                <a:gd name="connsiteX6" fmla="*/ 562469 w 1687408"/>
+                <a:gd name="connsiteX6" fmla="*/ 483597 w 1450791"/>
                 <a:gd name="connsiteY6" fmla="*/ 307777 h 307777"/>
-                <a:gd name="connsiteX7" fmla="*/ 0 w 1687408"/>
+                <a:gd name="connsiteX7" fmla="*/ 0 w 1450791"/>
                 <a:gd name="connsiteY7" fmla="*/ 307777 h 307777"/>
-                <a:gd name="connsiteX8" fmla="*/ 0 w 1687408"/>
+                <a:gd name="connsiteX8" fmla="*/ 0 w 1450791"/>
                 <a:gd name="connsiteY8" fmla="*/ 0 h 307777"/>
               </a:gdLst>
               <a:ahLst/>
@@ -15049,43 +14896,43 @@
               </a:cxnLst>
               <a:rect l="l" t="t" r="r" b="b"/>
               <a:pathLst>
-                <a:path w="1687408" h="307777" extrusionOk="0">
+                <a:path w="1450791" h="307777" extrusionOk="0">
                   <a:moveTo>
                     <a:pt x="0" y="0"/>
                   </a:moveTo>
                   <a:cubicBezTo>
-                    <a:pt x="128936" y="6660"/>
-                    <a:pt x="319593" y="-22133"/>
-                    <a:pt x="545595" y="0"/>
+                    <a:pt x="150675" y="-4249"/>
+                    <a:pt x="352734" y="-14730"/>
+                    <a:pt x="469089" y="0"/>
                   </a:cubicBezTo>
                   <a:cubicBezTo>
-                    <a:pt x="771597" y="22133"/>
-                    <a:pt x="809002" y="-23071"/>
-                    <a:pt x="1057442" y="0"/>
+                    <a:pt x="585444" y="14730"/>
+                    <a:pt x="789481" y="20990"/>
+                    <a:pt x="909162" y="0"/>
                   </a:cubicBezTo>
                   <a:cubicBezTo>
-                    <a:pt x="1305882" y="23071"/>
-                    <a:pt x="1451336" y="-20848"/>
-                    <a:pt x="1687408" y="0"/>
+                    <a:pt x="1028843" y="-20990"/>
+                    <a:pt x="1242402" y="2768"/>
+                    <a:pt x="1450791" y="0"/>
                   </a:cubicBezTo>
                   <a:cubicBezTo>
-                    <a:pt x="1692846" y="133970"/>
-                    <a:pt x="1683251" y="197125"/>
-                    <a:pt x="1687408" y="307777"/>
+                    <a:pt x="1456229" y="133970"/>
+                    <a:pt x="1446634" y="197125"/>
+                    <a:pt x="1450791" y="307777"/>
                   </a:cubicBezTo>
                   <a:cubicBezTo>
-                    <a:pt x="1482592" y="292155"/>
-                    <a:pt x="1308745" y="293224"/>
-                    <a:pt x="1158687" y="307777"/>
+                    <a:pt x="1333195" y="294757"/>
+                    <a:pt x="1100499" y="330196"/>
+                    <a:pt x="996210" y="307777"/>
                   </a:cubicBezTo>
                   <a:cubicBezTo>
-                    <a:pt x="1008629" y="322330"/>
-                    <a:pt x="799311" y="298125"/>
-                    <a:pt x="562469" y="307777"/>
+                    <a:pt x="891921" y="285358"/>
+                    <a:pt x="589493" y="289357"/>
+                    <a:pt x="483597" y="307777"/>
                   </a:cubicBezTo>
                   <a:cubicBezTo>
-                    <a:pt x="325627" y="317429"/>
-                    <a:pt x="126178" y="279914"/>
+                    <a:pt x="377701" y="326197"/>
+                    <a:pt x="104073" y="295228"/>
                     <a:pt x="0" y="307777"/>
                   </a:cubicBezTo>
                   <a:cubicBezTo>
@@ -16648,7 +16495,7 @@
             </p:nvCxnSpPr>
             <p:spPr>
               <a:xfrm flipV="1">
-                <a:off x="5227292" y="5193905"/>
+                <a:off x="5227292" y="5229249"/>
                 <a:ext cx="0" cy="190856"/>
               </a:xfrm>
               <a:prstGeom prst="line">
@@ -19570,7 +19417,7 @@
             </p:nvCxnSpPr>
             <p:spPr>
               <a:xfrm flipV="1">
-                <a:off x="5227292" y="5193905"/>
+                <a:off x="5227292" y="5229249"/>
                 <a:ext cx="0" cy="190856"/>
               </a:xfrm>
               <a:prstGeom prst="line">
@@ -22518,7 +22365,7 @@
             </p:nvCxnSpPr>
             <p:spPr>
               <a:xfrm flipV="1">
-                <a:off x="5227292" y="5500228"/>
+                <a:off x="5227292" y="5574844"/>
                 <a:ext cx="0" cy="190856"/>
               </a:xfrm>
               <a:prstGeom prst="line">
@@ -23215,8 +23062,8 @@
           </p:nvSpPr>
           <p:spPr>
             <a:xfrm>
-              <a:off x="3349154" y="497231"/>
-              <a:ext cx="1068317" cy="369332"/>
+              <a:off x="3349154" y="488520"/>
+              <a:ext cx="3971192" cy="646331"/>
             </a:xfrm>
             <a:prstGeom prst="rect">
               <a:avLst/>
@@ -23237,48 +23084,13 @@
                     </a:schemeClr>
                   </a:solidFill>
                 </a:rPr>
-                <a:t>Count to:</a:t>
+                <a:t>Count to: 10</a:t>
               </a:r>
             </a:p>
-          </p:txBody>
-        </p:sp>
-        <p:sp>
-          <p:nvSpPr>
-            <p:cNvPr id="65" name="TextBox 64">
-              <a:extLst>
-                <a:ext uri="{FF2B5EF4-FFF2-40B4-BE49-F238E27FC236}">
-                  <a16:creationId xmlns:a16="http://schemas.microsoft.com/office/drawing/2014/main" id="{22B51DAA-F573-D9AF-73EF-CBFF2CA229C4}"/>
-                </a:ext>
-              </a:extLst>
-            </p:cNvPr>
-            <p:cNvSpPr txBox="1"/>
-            <p:nvPr/>
-          </p:nvSpPr>
-          <p:spPr>
-            <a:xfrm>
-              <a:off x="4312659" y="508629"/>
-              <a:ext cx="636607" cy="369332"/>
-            </a:xfrm>
-            <a:prstGeom prst="rect">
-              <a:avLst/>
-            </a:prstGeom>
-            <a:noFill/>
-          </p:spPr>
-          <p:txBody>
-            <a:bodyPr wrap="square" rtlCol="0">
-              <a:spAutoFit/>
-            </a:bodyPr>
-            <a:lstStyle/>
             <a:p>
               <a:r>
-                <a:rPr lang="en-US" dirty="0">
-                  <a:solidFill>
-                    <a:schemeClr val="bg1">
-                      <a:lumMod val="65000"/>
-                    </a:schemeClr>
-                  </a:solidFill>
-                </a:rPr>
-                <a:t>10</a:t>
+                <a:rPr lang="en-US" dirty="0"/>
+                <a:t>0</a:t>
               </a:r>
             </a:p>
           </p:txBody>
@@ -23695,41 +23507,6 @@
           </p:txBody>
         </p:sp>
       </p:grpSp>
-      <p:sp>
-        <p:nvSpPr>
-          <p:cNvPr id="9" name="TextBox 8">
-            <a:extLst>
-              <a:ext uri="{FF2B5EF4-FFF2-40B4-BE49-F238E27FC236}">
-                <a16:creationId xmlns:a16="http://schemas.microsoft.com/office/drawing/2014/main" id="{986240EA-171D-8D23-EB6E-59C6FEBC0D54}"/>
-              </a:ext>
-            </a:extLst>
-          </p:cNvPr>
-          <p:cNvSpPr txBox="1"/>
-          <p:nvPr/>
-        </p:nvSpPr>
-        <p:spPr>
-          <a:xfrm>
-            <a:off x="3346797" y="3838695"/>
-            <a:ext cx="543099" cy="369332"/>
-          </a:xfrm>
-          <a:prstGeom prst="rect">
-            <a:avLst/>
-          </a:prstGeom>
-          <a:noFill/>
-        </p:spPr>
-        <p:txBody>
-          <a:bodyPr wrap="square" rtlCol="0">
-            <a:spAutoFit/>
-          </a:bodyPr>
-          <a:lstStyle/>
-          <a:p>
-            <a:r>
-              <a:rPr lang="en-US" dirty="0"/>
-              <a:t>0</a:t>
-            </a:r>
-          </a:p>
-        </p:txBody>
-      </p:sp>
       <p:grpSp>
         <p:nvGrpSpPr>
           <p:cNvPr id="32" name="Group 31">
@@ -23811,23 +23588,23 @@
             <a:custGeom>
               <a:avLst/>
               <a:gdLst>
-                <a:gd name="connsiteX0" fmla="*/ 0 w 1687408"/>
+                <a:gd name="connsiteX0" fmla="*/ 0 w 1450791"/>
                 <a:gd name="connsiteY0" fmla="*/ 0 h 307777"/>
-                <a:gd name="connsiteX1" fmla="*/ 545595 w 1687408"/>
+                <a:gd name="connsiteX1" fmla="*/ 469089 w 1450791"/>
                 <a:gd name="connsiteY1" fmla="*/ 0 h 307777"/>
-                <a:gd name="connsiteX2" fmla="*/ 1057442 w 1687408"/>
+                <a:gd name="connsiteX2" fmla="*/ 909162 w 1450791"/>
                 <a:gd name="connsiteY2" fmla="*/ 0 h 307777"/>
-                <a:gd name="connsiteX3" fmla="*/ 1687408 w 1687408"/>
+                <a:gd name="connsiteX3" fmla="*/ 1450791 w 1450791"/>
                 <a:gd name="connsiteY3" fmla="*/ 0 h 307777"/>
-                <a:gd name="connsiteX4" fmla="*/ 1687408 w 1687408"/>
+                <a:gd name="connsiteX4" fmla="*/ 1450791 w 1450791"/>
                 <a:gd name="connsiteY4" fmla="*/ 307777 h 307777"/>
-                <a:gd name="connsiteX5" fmla="*/ 1158687 w 1687408"/>
+                <a:gd name="connsiteX5" fmla="*/ 996210 w 1450791"/>
                 <a:gd name="connsiteY5" fmla="*/ 307777 h 307777"/>
-                <a:gd name="connsiteX6" fmla="*/ 562469 w 1687408"/>
+                <a:gd name="connsiteX6" fmla="*/ 483597 w 1450791"/>
                 <a:gd name="connsiteY6" fmla="*/ 307777 h 307777"/>
-                <a:gd name="connsiteX7" fmla="*/ 0 w 1687408"/>
+                <a:gd name="connsiteX7" fmla="*/ 0 w 1450791"/>
                 <a:gd name="connsiteY7" fmla="*/ 307777 h 307777"/>
-                <a:gd name="connsiteX8" fmla="*/ 0 w 1687408"/>
+                <a:gd name="connsiteX8" fmla="*/ 0 w 1450791"/>
                 <a:gd name="connsiteY8" fmla="*/ 0 h 307777"/>
               </a:gdLst>
               <a:ahLst/>
@@ -23862,43 +23639,43 @@
               </a:cxnLst>
               <a:rect l="l" t="t" r="r" b="b"/>
               <a:pathLst>
-                <a:path w="1687408" h="307777" extrusionOk="0">
+                <a:path w="1450791" h="307777" extrusionOk="0">
                   <a:moveTo>
                     <a:pt x="0" y="0"/>
                   </a:moveTo>
                   <a:cubicBezTo>
-                    <a:pt x="128936" y="6660"/>
-                    <a:pt x="319593" y="-22133"/>
-                    <a:pt x="545595" y="0"/>
+                    <a:pt x="150675" y="-4249"/>
+                    <a:pt x="352734" y="-14730"/>
+                    <a:pt x="469089" y="0"/>
                   </a:cubicBezTo>
                   <a:cubicBezTo>
-                    <a:pt x="771597" y="22133"/>
-                    <a:pt x="809002" y="-23071"/>
-                    <a:pt x="1057442" y="0"/>
+                    <a:pt x="585444" y="14730"/>
+                    <a:pt x="789481" y="20990"/>
+                    <a:pt x="909162" y="0"/>
                   </a:cubicBezTo>
                   <a:cubicBezTo>
-                    <a:pt x="1305882" y="23071"/>
-                    <a:pt x="1451336" y="-20848"/>
-                    <a:pt x="1687408" y="0"/>
+                    <a:pt x="1028843" y="-20990"/>
+                    <a:pt x="1242402" y="2768"/>
+                    <a:pt x="1450791" y="0"/>
                   </a:cubicBezTo>
                   <a:cubicBezTo>
-                    <a:pt x="1692846" y="133970"/>
-                    <a:pt x="1683251" y="197125"/>
-                    <a:pt x="1687408" y="307777"/>
+                    <a:pt x="1456229" y="133970"/>
+                    <a:pt x="1446634" y="197125"/>
+                    <a:pt x="1450791" y="307777"/>
                   </a:cubicBezTo>
                   <a:cubicBezTo>
-                    <a:pt x="1482592" y="292155"/>
-                    <a:pt x="1308745" y="293224"/>
-                    <a:pt x="1158687" y="307777"/>
+                    <a:pt x="1333195" y="294757"/>
+                    <a:pt x="1100499" y="330196"/>
+                    <a:pt x="996210" y="307777"/>
                   </a:cubicBezTo>
                   <a:cubicBezTo>
-                    <a:pt x="1008629" y="322330"/>
-                    <a:pt x="799311" y="298125"/>
-                    <a:pt x="562469" y="307777"/>
+                    <a:pt x="891921" y="285358"/>
+                    <a:pt x="589493" y="289357"/>
+                    <a:pt x="483597" y="307777"/>
                   </a:cubicBezTo>
                   <a:cubicBezTo>
-                    <a:pt x="325627" y="317429"/>
-                    <a:pt x="126178" y="279914"/>
+                    <a:pt x="377701" y="326197"/>
+                    <a:pt x="104073" y="295228"/>
                     <a:pt x="0" y="307777"/>
                   </a:cubicBezTo>
                   <a:cubicBezTo>
@@ -25475,7 +25252,7 @@
             </p:nvCxnSpPr>
             <p:spPr>
               <a:xfrm flipV="1">
-                <a:off x="5227292" y="5500228"/>
+                <a:off x="5227292" y="5574842"/>
                 <a:ext cx="0" cy="190856"/>
               </a:xfrm>
               <a:prstGeom prst="line">
@@ -26162,88 +25939,6 @@
         </p:pic>
         <p:sp>
           <p:nvSpPr>
-            <p:cNvPr id="64" name="TextBox 63">
-              <a:extLst>
-                <a:ext uri="{FF2B5EF4-FFF2-40B4-BE49-F238E27FC236}">
-                  <a16:creationId xmlns:a16="http://schemas.microsoft.com/office/drawing/2014/main" id="{523EAA83-709B-AEE7-421F-1B29939E5711}"/>
-                </a:ext>
-              </a:extLst>
-            </p:cNvPr>
-            <p:cNvSpPr txBox="1"/>
-            <p:nvPr/>
-          </p:nvSpPr>
-          <p:spPr>
-            <a:xfrm>
-              <a:off x="3349154" y="497231"/>
-              <a:ext cx="1068317" cy="369332"/>
-            </a:xfrm>
-            <a:prstGeom prst="rect">
-              <a:avLst/>
-            </a:prstGeom>
-            <a:noFill/>
-          </p:spPr>
-          <p:txBody>
-            <a:bodyPr wrap="square" rtlCol="0">
-              <a:spAutoFit/>
-            </a:bodyPr>
-            <a:lstStyle/>
-            <a:p>
-              <a:r>
-                <a:rPr lang="en-US" dirty="0">
-                  <a:solidFill>
-                    <a:schemeClr val="bg1">
-                      <a:lumMod val="65000"/>
-                    </a:schemeClr>
-                  </a:solidFill>
-                </a:rPr>
-                <a:t>Count to:</a:t>
-              </a:r>
-            </a:p>
-          </p:txBody>
-        </p:sp>
-        <p:sp>
-          <p:nvSpPr>
-            <p:cNvPr id="65" name="TextBox 64">
-              <a:extLst>
-                <a:ext uri="{FF2B5EF4-FFF2-40B4-BE49-F238E27FC236}">
-                  <a16:creationId xmlns:a16="http://schemas.microsoft.com/office/drawing/2014/main" id="{22B51DAA-F573-D9AF-73EF-CBFF2CA229C4}"/>
-                </a:ext>
-              </a:extLst>
-            </p:cNvPr>
-            <p:cNvSpPr txBox="1"/>
-            <p:nvPr/>
-          </p:nvSpPr>
-          <p:spPr>
-            <a:xfrm>
-              <a:off x="4312659" y="508629"/>
-              <a:ext cx="636607" cy="369332"/>
-            </a:xfrm>
-            <a:prstGeom prst="rect">
-              <a:avLst/>
-            </a:prstGeom>
-            <a:noFill/>
-          </p:spPr>
-          <p:txBody>
-            <a:bodyPr wrap="square" rtlCol="0">
-              <a:spAutoFit/>
-            </a:bodyPr>
-            <a:lstStyle/>
-            <a:p>
-              <a:r>
-                <a:rPr lang="en-US" dirty="0">
-                  <a:solidFill>
-                    <a:schemeClr val="bg1">
-                      <a:lumMod val="65000"/>
-                    </a:schemeClr>
-                  </a:solidFill>
-                </a:rPr>
-                <a:t>10</a:t>
-              </a:r>
-            </a:p>
-          </p:txBody>
-        </p:sp>
-        <p:sp>
-          <p:nvSpPr>
             <p:cNvPr id="11" name="TextBox 10">
               <a:extLst>
                 <a:ext uri="{FF2B5EF4-FFF2-40B4-BE49-F238E27FC236}">
@@ -26660,47 +26355,6 @@
           </p:txBody>
         </p:sp>
       </p:grpSp>
-      <p:sp>
-        <p:nvSpPr>
-          <p:cNvPr id="9" name="TextBox 8">
-            <a:extLst>
-              <a:ext uri="{FF2B5EF4-FFF2-40B4-BE49-F238E27FC236}">
-                <a16:creationId xmlns:a16="http://schemas.microsoft.com/office/drawing/2014/main" id="{986240EA-171D-8D23-EB6E-59C6FEBC0D54}"/>
-              </a:ext>
-            </a:extLst>
-          </p:cNvPr>
-          <p:cNvSpPr txBox="1"/>
-          <p:nvPr/>
-        </p:nvSpPr>
-        <p:spPr>
-          <a:xfrm>
-            <a:off x="3346797" y="3838695"/>
-            <a:ext cx="543099" cy="369332"/>
-          </a:xfrm>
-          <a:prstGeom prst="rect">
-            <a:avLst/>
-          </a:prstGeom>
-          <a:noFill/>
-        </p:spPr>
-        <p:txBody>
-          <a:bodyPr wrap="square" rtlCol="0">
-            <a:spAutoFit/>
-          </a:bodyPr>
-          <a:lstStyle/>
-          <a:p>
-            <a:r>
-              <a:rPr lang="en-US" dirty="0">
-                <a:solidFill>
-                  <a:schemeClr val="bg1">
-                    <a:lumMod val="65000"/>
-                  </a:schemeClr>
-                </a:solidFill>
-              </a:rPr>
-              <a:t>0</a:t>
-            </a:r>
-          </a:p>
-        </p:txBody>
-      </p:sp>
       <p:grpSp>
         <p:nvGrpSpPr>
           <p:cNvPr id="28" name="Group 27">
@@ -26782,23 +26436,23 @@
             <a:custGeom>
               <a:avLst/>
               <a:gdLst>
-                <a:gd name="connsiteX0" fmla="*/ 0 w 1687408"/>
+                <a:gd name="connsiteX0" fmla="*/ 0 w 1450791"/>
                 <a:gd name="connsiteY0" fmla="*/ 0 h 307777"/>
-                <a:gd name="connsiteX1" fmla="*/ 545595 w 1687408"/>
+                <a:gd name="connsiteX1" fmla="*/ 469089 w 1450791"/>
                 <a:gd name="connsiteY1" fmla="*/ 0 h 307777"/>
-                <a:gd name="connsiteX2" fmla="*/ 1057442 w 1687408"/>
+                <a:gd name="connsiteX2" fmla="*/ 909162 w 1450791"/>
                 <a:gd name="connsiteY2" fmla="*/ 0 h 307777"/>
-                <a:gd name="connsiteX3" fmla="*/ 1687408 w 1687408"/>
+                <a:gd name="connsiteX3" fmla="*/ 1450791 w 1450791"/>
                 <a:gd name="connsiteY3" fmla="*/ 0 h 307777"/>
-                <a:gd name="connsiteX4" fmla="*/ 1687408 w 1687408"/>
+                <a:gd name="connsiteX4" fmla="*/ 1450791 w 1450791"/>
                 <a:gd name="connsiteY4" fmla="*/ 307777 h 307777"/>
-                <a:gd name="connsiteX5" fmla="*/ 1158687 w 1687408"/>
+                <a:gd name="connsiteX5" fmla="*/ 996210 w 1450791"/>
                 <a:gd name="connsiteY5" fmla="*/ 307777 h 307777"/>
-                <a:gd name="connsiteX6" fmla="*/ 562469 w 1687408"/>
+                <a:gd name="connsiteX6" fmla="*/ 483597 w 1450791"/>
                 <a:gd name="connsiteY6" fmla="*/ 307777 h 307777"/>
-                <a:gd name="connsiteX7" fmla="*/ 0 w 1687408"/>
+                <a:gd name="connsiteX7" fmla="*/ 0 w 1450791"/>
                 <a:gd name="connsiteY7" fmla="*/ 307777 h 307777"/>
-                <a:gd name="connsiteX8" fmla="*/ 0 w 1687408"/>
+                <a:gd name="connsiteX8" fmla="*/ 0 w 1450791"/>
                 <a:gd name="connsiteY8" fmla="*/ 0 h 307777"/>
               </a:gdLst>
               <a:ahLst/>
@@ -26833,43 +26487,43 @@
               </a:cxnLst>
               <a:rect l="l" t="t" r="r" b="b"/>
               <a:pathLst>
-                <a:path w="1687408" h="307777" extrusionOk="0">
+                <a:path w="1450791" h="307777" extrusionOk="0">
                   <a:moveTo>
                     <a:pt x="0" y="0"/>
                   </a:moveTo>
                   <a:cubicBezTo>
-                    <a:pt x="128936" y="6660"/>
-                    <a:pt x="319593" y="-22133"/>
-                    <a:pt x="545595" y="0"/>
+                    <a:pt x="150675" y="-4249"/>
+                    <a:pt x="352734" y="-14730"/>
+                    <a:pt x="469089" y="0"/>
                   </a:cubicBezTo>
                   <a:cubicBezTo>
-                    <a:pt x="771597" y="22133"/>
-                    <a:pt x="809002" y="-23071"/>
-                    <a:pt x="1057442" y="0"/>
+                    <a:pt x="585444" y="14730"/>
+                    <a:pt x="789481" y="20990"/>
+                    <a:pt x="909162" y="0"/>
                   </a:cubicBezTo>
                   <a:cubicBezTo>
-                    <a:pt x="1305882" y="23071"/>
-                    <a:pt x="1451336" y="-20848"/>
-                    <a:pt x="1687408" y="0"/>
+                    <a:pt x="1028843" y="-20990"/>
+                    <a:pt x="1242402" y="2768"/>
+                    <a:pt x="1450791" y="0"/>
                   </a:cubicBezTo>
                   <a:cubicBezTo>
-                    <a:pt x="1692846" y="133970"/>
-                    <a:pt x="1683251" y="197125"/>
-                    <a:pt x="1687408" y="307777"/>
+                    <a:pt x="1456229" y="133970"/>
+                    <a:pt x="1446634" y="197125"/>
+                    <a:pt x="1450791" y="307777"/>
                   </a:cubicBezTo>
                   <a:cubicBezTo>
-                    <a:pt x="1482592" y="292155"/>
-                    <a:pt x="1308745" y="293224"/>
-                    <a:pt x="1158687" y="307777"/>
+                    <a:pt x="1333195" y="294757"/>
+                    <a:pt x="1100499" y="330196"/>
+                    <a:pt x="996210" y="307777"/>
                   </a:cubicBezTo>
                   <a:cubicBezTo>
-                    <a:pt x="1008629" y="322330"/>
-                    <a:pt x="799311" y="298125"/>
-                    <a:pt x="562469" y="307777"/>
+                    <a:pt x="891921" y="285358"/>
+                    <a:pt x="589493" y="289357"/>
+                    <a:pt x="483597" y="307777"/>
                   </a:cubicBezTo>
                   <a:cubicBezTo>
-                    <a:pt x="325627" y="317429"/>
-                    <a:pt x="126178" y="279914"/>
+                    <a:pt x="377701" y="326197"/>
+                    <a:pt x="104073" y="295228"/>
                     <a:pt x="0" y="307777"/>
                   </a:cubicBezTo>
                   <a:cubicBezTo>
@@ -27104,6 +26758,59 @@
             <a:r>
               <a:rPr lang="en-US" dirty="0"/>
               <a:t>1</a:t>
+            </a:r>
+          </a:p>
+        </p:txBody>
+      </p:sp>
+      <p:sp>
+        <p:nvSpPr>
+          <p:cNvPr id="4" name="TextBox 3">
+            <a:extLst>
+              <a:ext uri="{FF2B5EF4-FFF2-40B4-BE49-F238E27FC236}">
+                <a16:creationId xmlns:a16="http://schemas.microsoft.com/office/drawing/2014/main" id="{A1FFC947-BEC3-12FF-7F64-BE5C0C2E70D1}"/>
+              </a:ext>
+            </a:extLst>
+          </p:cNvPr>
+          <p:cNvSpPr txBox="1"/>
+          <p:nvPr/>
+        </p:nvSpPr>
+        <p:spPr>
+          <a:xfrm>
+            <a:off x="3346926" y="3597018"/>
+            <a:ext cx="3971192" cy="646331"/>
+          </a:xfrm>
+          <a:prstGeom prst="rect">
+            <a:avLst/>
+          </a:prstGeom>
+          <a:noFill/>
+        </p:spPr>
+        <p:txBody>
+          <a:bodyPr wrap="square" rtlCol="0">
+            <a:spAutoFit/>
+          </a:bodyPr>
+          <a:lstStyle/>
+          <a:p>
+            <a:r>
+              <a:rPr lang="en-US" dirty="0">
+                <a:solidFill>
+                  <a:schemeClr val="bg1">
+                    <a:lumMod val="65000"/>
+                  </a:schemeClr>
+                </a:solidFill>
+              </a:rPr>
+              <a:t>Count to: 10</a:t>
+            </a:r>
+          </a:p>
+          <a:p>
+            <a:r>
+              <a:rPr lang="en-US" dirty="0">
+                <a:solidFill>
+                  <a:schemeClr val="bg1">
+                    <a:lumMod val="65000"/>
+                  </a:schemeClr>
+                </a:solidFill>
+              </a:rPr>
+              <a:t>0</a:t>
             </a:r>
           </a:p>
         </p:txBody>
@@ -28563,51 +28270,6 @@
               </a:p>
             </p:txBody>
           </p:sp>
-          <p:cxnSp>
-            <p:nvCxnSpPr>
-              <p:cNvPr id="109" name="Straight Connector 108">
-                <a:extLst>
-                  <a:ext uri="{FF2B5EF4-FFF2-40B4-BE49-F238E27FC236}">
-                    <a16:creationId xmlns:a16="http://schemas.microsoft.com/office/drawing/2014/main" id="{66A45FBB-357A-5752-2DFB-F3411E54BCC4}"/>
-                  </a:ext>
-                </a:extLst>
-              </p:cNvPr>
-              <p:cNvCxnSpPr>
-                <a:cxnSpLocks/>
-              </p:cNvCxnSpPr>
-              <p:nvPr/>
-            </p:nvCxnSpPr>
-            <p:spPr>
-              <a:xfrm flipV="1">
-                <a:off x="5227292" y="5500228"/>
-                <a:ext cx="0" cy="190856"/>
-              </a:xfrm>
-              <a:prstGeom prst="line">
-                <a:avLst/>
-              </a:prstGeom>
-              <a:ln w="25400">
-                <a:solidFill>
-                  <a:schemeClr val="bg1">
-                    <a:lumMod val="65000"/>
-                  </a:schemeClr>
-                </a:solidFill>
-              </a:ln>
-            </p:spPr>
-            <p:style>
-              <a:lnRef idx="1">
-                <a:schemeClr val="accent1"/>
-              </a:lnRef>
-              <a:fillRef idx="0">
-                <a:schemeClr val="accent1"/>
-              </a:fillRef>
-              <a:effectRef idx="0">
-                <a:schemeClr val="accent1"/>
-              </a:effectRef>
-              <a:fontRef idx="minor">
-                <a:schemeClr val="tx1"/>
-              </a:fontRef>
-            </p:style>
-          </p:cxnSp>
         </p:grpSp>
         <p:sp>
           <p:nvSpPr>
@@ -29266,88 +28928,6 @@
         </p:pic>
         <p:sp>
           <p:nvSpPr>
-            <p:cNvPr id="64" name="TextBox 63">
-              <a:extLst>
-                <a:ext uri="{FF2B5EF4-FFF2-40B4-BE49-F238E27FC236}">
-                  <a16:creationId xmlns:a16="http://schemas.microsoft.com/office/drawing/2014/main" id="{523EAA83-709B-AEE7-421F-1B29939E5711}"/>
-                </a:ext>
-              </a:extLst>
-            </p:cNvPr>
-            <p:cNvSpPr txBox="1"/>
-            <p:nvPr/>
-          </p:nvSpPr>
-          <p:spPr>
-            <a:xfrm>
-              <a:off x="3349154" y="497231"/>
-              <a:ext cx="1068317" cy="369332"/>
-            </a:xfrm>
-            <a:prstGeom prst="rect">
-              <a:avLst/>
-            </a:prstGeom>
-            <a:noFill/>
-          </p:spPr>
-          <p:txBody>
-            <a:bodyPr wrap="square" rtlCol="0">
-              <a:spAutoFit/>
-            </a:bodyPr>
-            <a:lstStyle/>
-            <a:p>
-              <a:r>
-                <a:rPr lang="en-US" dirty="0">
-                  <a:solidFill>
-                    <a:schemeClr val="bg1">
-                      <a:lumMod val="65000"/>
-                    </a:schemeClr>
-                  </a:solidFill>
-                </a:rPr>
-                <a:t>Count to:</a:t>
-              </a:r>
-            </a:p>
-          </p:txBody>
-        </p:sp>
-        <p:sp>
-          <p:nvSpPr>
-            <p:cNvPr id="65" name="TextBox 64">
-              <a:extLst>
-                <a:ext uri="{FF2B5EF4-FFF2-40B4-BE49-F238E27FC236}">
-                  <a16:creationId xmlns:a16="http://schemas.microsoft.com/office/drawing/2014/main" id="{22B51DAA-F573-D9AF-73EF-CBFF2CA229C4}"/>
-                </a:ext>
-              </a:extLst>
-            </p:cNvPr>
-            <p:cNvSpPr txBox="1"/>
-            <p:nvPr/>
-          </p:nvSpPr>
-          <p:spPr>
-            <a:xfrm>
-              <a:off x="4312659" y="508629"/>
-              <a:ext cx="636607" cy="369332"/>
-            </a:xfrm>
-            <a:prstGeom prst="rect">
-              <a:avLst/>
-            </a:prstGeom>
-            <a:noFill/>
-          </p:spPr>
-          <p:txBody>
-            <a:bodyPr wrap="square" rtlCol="0">
-              <a:spAutoFit/>
-            </a:bodyPr>
-            <a:lstStyle/>
-            <a:p>
-              <a:r>
-                <a:rPr lang="en-US" dirty="0">
-                  <a:solidFill>
-                    <a:schemeClr val="bg1">
-                      <a:lumMod val="65000"/>
-                    </a:schemeClr>
-                  </a:solidFill>
-                </a:rPr>
-                <a:t>10</a:t>
-              </a:r>
-            </a:p>
-          </p:txBody>
-        </p:sp>
-        <p:sp>
-          <p:nvSpPr>
             <p:cNvPr id="11" name="TextBox 10">
               <a:extLst>
                 <a:ext uri="{FF2B5EF4-FFF2-40B4-BE49-F238E27FC236}">
@@ -29723,47 +29303,6 @@
           </p:txBody>
         </p:sp>
       </p:grpSp>
-      <p:sp>
-        <p:nvSpPr>
-          <p:cNvPr id="9" name="TextBox 8">
-            <a:extLst>
-              <a:ext uri="{FF2B5EF4-FFF2-40B4-BE49-F238E27FC236}">
-                <a16:creationId xmlns:a16="http://schemas.microsoft.com/office/drawing/2014/main" id="{986240EA-171D-8D23-EB6E-59C6FEBC0D54}"/>
-              </a:ext>
-            </a:extLst>
-          </p:cNvPr>
-          <p:cNvSpPr txBox="1"/>
-          <p:nvPr/>
-        </p:nvSpPr>
-        <p:spPr>
-          <a:xfrm>
-            <a:off x="3346797" y="3838695"/>
-            <a:ext cx="543099" cy="369332"/>
-          </a:xfrm>
-          <a:prstGeom prst="rect">
-            <a:avLst/>
-          </a:prstGeom>
-          <a:noFill/>
-        </p:spPr>
-        <p:txBody>
-          <a:bodyPr wrap="square" rtlCol="0">
-            <a:spAutoFit/>
-          </a:bodyPr>
-          <a:lstStyle/>
-          <a:p>
-            <a:r>
-              <a:rPr lang="en-US" dirty="0">
-                <a:solidFill>
-                  <a:schemeClr val="bg1">
-                    <a:lumMod val="65000"/>
-                  </a:schemeClr>
-                </a:solidFill>
-              </a:rPr>
-              <a:t>0</a:t>
-            </a:r>
-          </a:p>
-        </p:txBody>
-      </p:sp>
       <p:grpSp>
         <p:nvGrpSpPr>
           <p:cNvPr id="28" name="Group 27">
@@ -30059,6 +29598,104 @@
           </a:p>
         </p:txBody>
       </p:sp>
+      <p:sp>
+        <p:nvSpPr>
+          <p:cNvPr id="7" name="TextBox 6">
+            <a:extLst>
+              <a:ext uri="{FF2B5EF4-FFF2-40B4-BE49-F238E27FC236}">
+                <a16:creationId xmlns:a16="http://schemas.microsoft.com/office/drawing/2014/main" id="{746EB520-C359-D283-A56D-1AB0C1A3B55C}"/>
+              </a:ext>
+            </a:extLst>
+          </p:cNvPr>
+          <p:cNvSpPr txBox="1"/>
+          <p:nvPr/>
+        </p:nvSpPr>
+        <p:spPr>
+          <a:xfrm>
+            <a:off x="3346926" y="3597018"/>
+            <a:ext cx="3971192" cy="646331"/>
+          </a:xfrm>
+          <a:prstGeom prst="rect">
+            <a:avLst/>
+          </a:prstGeom>
+          <a:noFill/>
+        </p:spPr>
+        <p:txBody>
+          <a:bodyPr wrap="square" rtlCol="0">
+            <a:spAutoFit/>
+          </a:bodyPr>
+          <a:lstStyle/>
+          <a:p>
+            <a:r>
+              <a:rPr lang="en-US" dirty="0">
+                <a:solidFill>
+                  <a:schemeClr val="bg1">
+                    <a:lumMod val="65000"/>
+                  </a:schemeClr>
+                </a:solidFill>
+              </a:rPr>
+              <a:t>Count to: 10</a:t>
+            </a:r>
+          </a:p>
+          <a:p>
+            <a:r>
+              <a:rPr lang="en-US" dirty="0">
+                <a:solidFill>
+                  <a:schemeClr val="bg1">
+                    <a:lumMod val="65000"/>
+                  </a:schemeClr>
+                </a:solidFill>
+              </a:rPr>
+              <a:t>0</a:t>
+            </a:r>
+          </a:p>
+        </p:txBody>
+      </p:sp>
+      <p:cxnSp>
+        <p:nvCxnSpPr>
+          <p:cNvPr id="8" name="Straight Connector 7">
+            <a:extLst>
+              <a:ext uri="{FF2B5EF4-FFF2-40B4-BE49-F238E27FC236}">
+                <a16:creationId xmlns:a16="http://schemas.microsoft.com/office/drawing/2014/main" id="{57641790-375F-A97E-41EF-5199A3E63A79}"/>
+              </a:ext>
+            </a:extLst>
+          </p:cNvPr>
+          <p:cNvCxnSpPr>
+            <a:cxnSpLocks/>
+          </p:cNvCxnSpPr>
+          <p:nvPr/>
+        </p:nvCxnSpPr>
+        <p:spPr>
+          <a:xfrm flipV="1">
+            <a:off x="3473510" y="4224720"/>
+            <a:ext cx="0" cy="155924"/>
+          </a:xfrm>
+          <a:prstGeom prst="line">
+            <a:avLst/>
+          </a:prstGeom>
+          <a:ln w="25400">
+            <a:solidFill>
+              <a:schemeClr val="bg1">
+                <a:lumMod val="65000"/>
+              </a:schemeClr>
+            </a:solidFill>
+          </a:ln>
+        </p:spPr>
+        <p:style>
+          <a:lnRef idx="1">
+            <a:schemeClr val="accent1"/>
+          </a:lnRef>
+          <a:fillRef idx="0">
+            <a:schemeClr val="accent1"/>
+          </a:fillRef>
+          <a:effectRef idx="0">
+            <a:schemeClr val="accent1"/>
+          </a:effectRef>
+          <a:fontRef idx="minor">
+            <a:schemeClr val="tx1"/>
+          </a:fontRef>
+        </p:style>
+      </p:cxnSp>
     </p:spTree>
     <p:extLst>
       <p:ext uri="{BB962C8B-B14F-4D97-AF65-F5344CB8AC3E}">
@@ -31529,7 +31166,7 @@
             </p:nvCxnSpPr>
             <p:spPr>
               <a:xfrm flipV="1">
-                <a:off x="5227292" y="5782989"/>
+                <a:off x="5227292" y="5942891"/>
                 <a:ext cx="0" cy="190856"/>
               </a:xfrm>
               <a:prstGeom prst="line">
@@ -32214,88 +31851,6 @@
         </p:pic>
         <p:sp>
           <p:nvSpPr>
-            <p:cNvPr id="64" name="TextBox 63">
-              <a:extLst>
-                <a:ext uri="{FF2B5EF4-FFF2-40B4-BE49-F238E27FC236}">
-                  <a16:creationId xmlns:a16="http://schemas.microsoft.com/office/drawing/2014/main" id="{523EAA83-709B-AEE7-421F-1B29939E5711}"/>
-                </a:ext>
-              </a:extLst>
-            </p:cNvPr>
-            <p:cNvSpPr txBox="1"/>
-            <p:nvPr/>
-          </p:nvSpPr>
-          <p:spPr>
-            <a:xfrm>
-              <a:off x="3349154" y="497231"/>
-              <a:ext cx="1068317" cy="369332"/>
-            </a:xfrm>
-            <a:prstGeom prst="rect">
-              <a:avLst/>
-            </a:prstGeom>
-            <a:noFill/>
-          </p:spPr>
-          <p:txBody>
-            <a:bodyPr wrap="square" rtlCol="0">
-              <a:spAutoFit/>
-            </a:bodyPr>
-            <a:lstStyle/>
-            <a:p>
-              <a:r>
-                <a:rPr lang="en-US" dirty="0">
-                  <a:solidFill>
-                    <a:schemeClr val="bg1">
-                      <a:lumMod val="65000"/>
-                    </a:schemeClr>
-                  </a:solidFill>
-                </a:rPr>
-                <a:t>Count to:</a:t>
-              </a:r>
-            </a:p>
-          </p:txBody>
-        </p:sp>
-        <p:sp>
-          <p:nvSpPr>
-            <p:cNvPr id="65" name="TextBox 64">
-              <a:extLst>
-                <a:ext uri="{FF2B5EF4-FFF2-40B4-BE49-F238E27FC236}">
-                  <a16:creationId xmlns:a16="http://schemas.microsoft.com/office/drawing/2014/main" id="{22B51DAA-F573-D9AF-73EF-CBFF2CA229C4}"/>
-                </a:ext>
-              </a:extLst>
-            </p:cNvPr>
-            <p:cNvSpPr txBox="1"/>
-            <p:nvPr/>
-          </p:nvSpPr>
-          <p:spPr>
-            <a:xfrm>
-              <a:off x="4312659" y="508629"/>
-              <a:ext cx="636607" cy="369332"/>
-            </a:xfrm>
-            <a:prstGeom prst="rect">
-              <a:avLst/>
-            </a:prstGeom>
-            <a:noFill/>
-          </p:spPr>
-          <p:txBody>
-            <a:bodyPr wrap="square" rtlCol="0">
-              <a:spAutoFit/>
-            </a:bodyPr>
-            <a:lstStyle/>
-            <a:p>
-              <a:r>
-                <a:rPr lang="en-US" dirty="0">
-                  <a:solidFill>
-                    <a:schemeClr val="bg1">
-                      <a:lumMod val="65000"/>
-                    </a:schemeClr>
-                  </a:solidFill>
-                </a:rPr>
-                <a:t>10</a:t>
-              </a:r>
-            </a:p>
-          </p:txBody>
-        </p:sp>
-        <p:sp>
-          <p:nvSpPr>
             <p:cNvPr id="11" name="TextBox 10">
               <a:extLst>
                 <a:ext uri="{FF2B5EF4-FFF2-40B4-BE49-F238E27FC236}">
@@ -32685,47 +32240,6 @@
           </p:txBody>
         </p:sp>
       </p:grpSp>
-      <p:sp>
-        <p:nvSpPr>
-          <p:cNvPr id="9" name="TextBox 8">
-            <a:extLst>
-              <a:ext uri="{FF2B5EF4-FFF2-40B4-BE49-F238E27FC236}">
-                <a16:creationId xmlns:a16="http://schemas.microsoft.com/office/drawing/2014/main" id="{986240EA-171D-8D23-EB6E-59C6FEBC0D54}"/>
-              </a:ext>
-            </a:extLst>
-          </p:cNvPr>
-          <p:cNvSpPr txBox="1"/>
-          <p:nvPr/>
-        </p:nvSpPr>
-        <p:spPr>
-          <a:xfrm>
-            <a:off x="3346797" y="3838695"/>
-            <a:ext cx="543099" cy="369332"/>
-          </a:xfrm>
-          <a:prstGeom prst="rect">
-            <a:avLst/>
-          </a:prstGeom>
-          <a:noFill/>
-        </p:spPr>
-        <p:txBody>
-          <a:bodyPr wrap="square" rtlCol="0">
-            <a:spAutoFit/>
-          </a:bodyPr>
-          <a:lstStyle/>
-          <a:p>
-            <a:r>
-              <a:rPr lang="en-US" dirty="0">
-                <a:solidFill>
-                  <a:schemeClr val="bg1">
-                    <a:lumMod val="65000"/>
-                  </a:schemeClr>
-                </a:solidFill>
-              </a:rPr>
-              <a:t>0</a:t>
-            </a:r>
-          </a:p>
-        </p:txBody>
-      </p:sp>
       <p:grpSp>
         <p:nvGrpSpPr>
           <p:cNvPr id="28" name="Group 27">
@@ -33043,10 +32557,10 @@
       </p:sp>
       <p:sp>
         <p:nvSpPr>
-          <p:cNvPr id="4" name="TextBox 3">
+          <p:cNvPr id="8" name="TextBox 7">
             <a:extLst>
               <a:ext uri="{FF2B5EF4-FFF2-40B4-BE49-F238E27FC236}">
-                <a16:creationId xmlns:a16="http://schemas.microsoft.com/office/drawing/2014/main" id="{5C5DA5A8-9246-7F2E-D3CB-A1794049600E}"/>
+                <a16:creationId xmlns:a16="http://schemas.microsoft.com/office/drawing/2014/main" id="{1FEDE3DF-DF0E-2387-8BA5-46503BBF85C1}"/>
               </a:ext>
             </a:extLst>
           </p:cNvPr>
@@ -33055,8 +32569,8 @@
         </p:nvSpPr>
         <p:spPr>
           <a:xfrm>
-            <a:off x="3345192" y="4058470"/>
-            <a:ext cx="543099" cy="369332"/>
+            <a:off x="3346926" y="3597018"/>
+            <a:ext cx="3971192" cy="923330"/>
           </a:xfrm>
           <a:prstGeom prst="rect">
             <a:avLst/>
@@ -33068,6 +32582,30 @@
             <a:spAutoFit/>
           </a:bodyPr>
           <a:lstStyle/>
+          <a:p>
+            <a:r>
+              <a:rPr lang="en-US" dirty="0">
+                <a:solidFill>
+                  <a:schemeClr val="bg1">
+                    <a:lumMod val="65000"/>
+                  </a:schemeClr>
+                </a:solidFill>
+              </a:rPr>
+              <a:t>Count to: 10</a:t>
+            </a:r>
+          </a:p>
+          <a:p>
+            <a:r>
+              <a:rPr lang="en-US" dirty="0">
+                <a:solidFill>
+                  <a:schemeClr val="bg1">
+                    <a:lumMod val="65000"/>
+                  </a:schemeClr>
+                </a:solidFill>
+              </a:rPr>
+              <a:t>0</a:t>
+            </a:r>
+          </a:p>
           <a:p>
             <a:r>
               <a:rPr lang="en-US" dirty="0"/>
@@ -33134,7 +32672,7 @@
         </p:nvGrpSpPr>
         <p:grpSpPr>
           <a:xfrm>
-            <a:off x="229043" y="218311"/>
+            <a:off x="229043" y="371219"/>
             <a:ext cx="7101587" cy="4685065"/>
             <a:chOff x="231271" y="-2890187"/>
             <a:chExt cx="7101587" cy="4685065"/>
@@ -35215,88 +34753,6 @@
         </p:pic>
         <p:sp>
           <p:nvSpPr>
-            <p:cNvPr id="64" name="TextBox 63">
-              <a:extLst>
-                <a:ext uri="{FF2B5EF4-FFF2-40B4-BE49-F238E27FC236}">
-                  <a16:creationId xmlns:a16="http://schemas.microsoft.com/office/drawing/2014/main" id="{523EAA83-709B-AEE7-421F-1B29939E5711}"/>
-                </a:ext>
-              </a:extLst>
-            </p:cNvPr>
-            <p:cNvSpPr txBox="1"/>
-            <p:nvPr/>
-          </p:nvSpPr>
-          <p:spPr>
-            <a:xfrm>
-              <a:off x="3349154" y="497231"/>
-              <a:ext cx="1068317" cy="369332"/>
-            </a:xfrm>
-            <a:prstGeom prst="rect">
-              <a:avLst/>
-            </a:prstGeom>
-            <a:noFill/>
-          </p:spPr>
-          <p:txBody>
-            <a:bodyPr wrap="square" rtlCol="0">
-              <a:spAutoFit/>
-            </a:bodyPr>
-            <a:lstStyle/>
-            <a:p>
-              <a:r>
-                <a:rPr lang="en-US" dirty="0">
-                  <a:solidFill>
-                    <a:schemeClr val="bg1">
-                      <a:lumMod val="65000"/>
-                    </a:schemeClr>
-                  </a:solidFill>
-                </a:rPr>
-                <a:t>Count to:</a:t>
-              </a:r>
-            </a:p>
-          </p:txBody>
-        </p:sp>
-        <p:sp>
-          <p:nvSpPr>
-            <p:cNvPr id="65" name="TextBox 64">
-              <a:extLst>
-                <a:ext uri="{FF2B5EF4-FFF2-40B4-BE49-F238E27FC236}">
-                  <a16:creationId xmlns:a16="http://schemas.microsoft.com/office/drawing/2014/main" id="{22B51DAA-F573-D9AF-73EF-CBFF2CA229C4}"/>
-                </a:ext>
-              </a:extLst>
-            </p:cNvPr>
-            <p:cNvSpPr txBox="1"/>
-            <p:nvPr/>
-          </p:nvSpPr>
-          <p:spPr>
-            <a:xfrm>
-              <a:off x="4312659" y="508629"/>
-              <a:ext cx="636607" cy="369332"/>
-            </a:xfrm>
-            <a:prstGeom prst="rect">
-              <a:avLst/>
-            </a:prstGeom>
-            <a:noFill/>
-          </p:spPr>
-          <p:txBody>
-            <a:bodyPr wrap="square" rtlCol="0">
-              <a:spAutoFit/>
-            </a:bodyPr>
-            <a:lstStyle/>
-            <a:p>
-              <a:r>
-                <a:rPr lang="en-US" dirty="0">
-                  <a:solidFill>
-                    <a:schemeClr val="bg1">
-                      <a:lumMod val="65000"/>
-                    </a:schemeClr>
-                  </a:solidFill>
-                </a:rPr>
-                <a:t>10</a:t>
-              </a:r>
-            </a:p>
-          </p:txBody>
-        </p:sp>
-        <p:sp>
-          <p:nvSpPr>
             <p:cNvPr id="11" name="TextBox 10">
               <a:extLst>
                 <a:ext uri="{FF2B5EF4-FFF2-40B4-BE49-F238E27FC236}">
@@ -35713,47 +35169,6 @@
           </p:txBody>
         </p:sp>
       </p:grpSp>
-      <p:sp>
-        <p:nvSpPr>
-          <p:cNvPr id="9" name="TextBox 8">
-            <a:extLst>
-              <a:ext uri="{FF2B5EF4-FFF2-40B4-BE49-F238E27FC236}">
-                <a16:creationId xmlns:a16="http://schemas.microsoft.com/office/drawing/2014/main" id="{986240EA-171D-8D23-EB6E-59C6FEBC0D54}"/>
-              </a:ext>
-            </a:extLst>
-          </p:cNvPr>
-          <p:cNvSpPr txBox="1"/>
-          <p:nvPr/>
-        </p:nvSpPr>
-        <p:spPr>
-          <a:xfrm>
-            <a:off x="3346797" y="3838695"/>
-            <a:ext cx="543099" cy="369332"/>
-          </a:xfrm>
-          <a:prstGeom prst="rect">
-            <a:avLst/>
-          </a:prstGeom>
-          <a:noFill/>
-        </p:spPr>
-        <p:txBody>
-          <a:bodyPr wrap="square" rtlCol="0">
-            <a:spAutoFit/>
-          </a:bodyPr>
-          <a:lstStyle/>
-          <a:p>
-            <a:r>
-              <a:rPr lang="en-US" dirty="0">
-                <a:solidFill>
-                  <a:schemeClr val="bg1">
-                    <a:lumMod val="65000"/>
-                  </a:schemeClr>
-                </a:solidFill>
-              </a:rPr>
-              <a:t>0</a:t>
-            </a:r>
-          </a:p>
-        </p:txBody>
-      </p:sp>
       <p:grpSp>
         <p:nvGrpSpPr>
           <p:cNvPr id="28" name="Group 27">
@@ -36163,10 +35578,10 @@
       </p:sp>
       <p:sp>
         <p:nvSpPr>
-          <p:cNvPr id="68" name="TextBox 67">
+          <p:cNvPr id="4" name="TextBox 3">
             <a:extLst>
               <a:ext uri="{FF2B5EF4-FFF2-40B4-BE49-F238E27FC236}">
-                <a16:creationId xmlns:a16="http://schemas.microsoft.com/office/drawing/2014/main" id="{B89EA0DE-1E59-B39C-A571-F622049B6F3C}"/>
+                <a16:creationId xmlns:a16="http://schemas.microsoft.com/office/drawing/2014/main" id="{CF3D4C9A-85D2-90D2-2FF3-A9866FA8D437}"/>
               </a:ext>
             </a:extLst>
           </p:cNvPr>
@@ -36175,8 +35590,8 @@
         </p:nvSpPr>
         <p:spPr>
           <a:xfrm>
-            <a:off x="3345192" y="4058470"/>
-            <a:ext cx="543099" cy="369332"/>
+            <a:off x="3346926" y="3762484"/>
+            <a:ext cx="3971192" cy="923330"/>
           </a:xfrm>
           <a:prstGeom prst="rect">
             <a:avLst/>
@@ -36197,11 +35612,80 @@
                   </a:schemeClr>
                 </a:solidFill>
               </a:rPr>
+              <a:t>Count to: 10</a:t>
+            </a:r>
+          </a:p>
+          <a:p>
+            <a:r>
+              <a:rPr lang="en-US" dirty="0">
+                <a:solidFill>
+                  <a:schemeClr val="bg1">
+                    <a:lumMod val="65000"/>
+                  </a:schemeClr>
+                </a:solidFill>
+              </a:rPr>
+              <a:t>0</a:t>
+            </a:r>
+          </a:p>
+          <a:p>
+            <a:r>
+              <a:rPr lang="en-US" dirty="0">
+                <a:solidFill>
+                  <a:schemeClr val="bg1">
+                    <a:lumMod val="65000"/>
+                  </a:schemeClr>
+                </a:solidFill>
+              </a:rPr>
               <a:t>1</a:t>
             </a:r>
           </a:p>
         </p:txBody>
       </p:sp>
+      <p:cxnSp>
+        <p:nvCxnSpPr>
+          <p:cNvPr id="7" name="Straight Connector 6">
+            <a:extLst>
+              <a:ext uri="{FF2B5EF4-FFF2-40B4-BE49-F238E27FC236}">
+                <a16:creationId xmlns:a16="http://schemas.microsoft.com/office/drawing/2014/main" id="{FC7AFA37-B377-3309-CAFF-012CC6050085}"/>
+              </a:ext>
+            </a:extLst>
+          </p:cNvPr>
+          <p:cNvCxnSpPr>
+            <a:cxnSpLocks/>
+          </p:cNvCxnSpPr>
+          <p:nvPr/>
+        </p:nvCxnSpPr>
+        <p:spPr>
+          <a:xfrm flipV="1">
+            <a:off x="3490928" y="4682163"/>
+            <a:ext cx="0" cy="155924"/>
+          </a:xfrm>
+          <a:prstGeom prst="line">
+            <a:avLst/>
+          </a:prstGeom>
+          <a:ln w="25400">
+            <a:solidFill>
+              <a:schemeClr val="bg1">
+                <a:lumMod val="65000"/>
+              </a:schemeClr>
+            </a:solidFill>
+          </a:ln>
+        </p:spPr>
+        <p:style>
+          <a:lnRef idx="1">
+            <a:schemeClr val="accent1"/>
+          </a:lnRef>
+          <a:fillRef idx="0">
+            <a:schemeClr val="accent1"/>
+          </a:fillRef>
+          <a:effectRef idx="0">
+            <a:schemeClr val="accent1"/>
+          </a:effectRef>
+          <a:fontRef idx="minor">
+            <a:schemeClr val="tx1"/>
+          </a:fontRef>
+        </p:style>
+      </p:cxnSp>
     </p:spTree>
     <p:extLst>
       <p:ext uri="{BB962C8B-B14F-4D97-AF65-F5344CB8AC3E}">

</xml_diff>

<commit_message>
Reorganise slider files into sub-folders for easier export
</commit_message>
<xml_diff>
--- a/resources/ppt-slides/control-flow-while-loop.pptx
+++ b/resources/ppt-slides/control-flow-while-loop.pptx
@@ -253,7 +253,7 @@
           <a:p>
             <a:fld id="{964302DC-9F53-934F-AE4D-0F1F197008C1}" type="datetimeFigureOut">
               <a:rPr lang="en-US" smtClean="0"/>
-              <a:t>10/4/23</a:t>
+              <a:t>2/9/24</a:t>
             </a:fld>
             <a:endParaRPr lang="en-US"/>
           </a:p>
@@ -423,7 +423,7 @@
           <a:p>
             <a:fld id="{964302DC-9F53-934F-AE4D-0F1F197008C1}" type="datetimeFigureOut">
               <a:rPr lang="en-US" smtClean="0"/>
-              <a:t>10/4/23</a:t>
+              <a:t>2/9/24</a:t>
             </a:fld>
             <a:endParaRPr lang="en-US"/>
           </a:p>
@@ -603,7 +603,7 @@
           <a:p>
             <a:fld id="{964302DC-9F53-934F-AE4D-0F1F197008C1}" type="datetimeFigureOut">
               <a:rPr lang="en-US" smtClean="0"/>
-              <a:t>10/4/23</a:t>
+              <a:t>2/9/24</a:t>
             </a:fld>
             <a:endParaRPr lang="en-US"/>
           </a:p>
@@ -773,7 +773,7 @@
           <a:p>
             <a:fld id="{964302DC-9F53-934F-AE4D-0F1F197008C1}" type="datetimeFigureOut">
               <a:rPr lang="en-US" smtClean="0"/>
-              <a:t>10/4/23</a:t>
+              <a:t>2/9/24</a:t>
             </a:fld>
             <a:endParaRPr lang="en-US"/>
           </a:p>
@@ -1017,7 +1017,7 @@
           <a:p>
             <a:fld id="{964302DC-9F53-934F-AE4D-0F1F197008C1}" type="datetimeFigureOut">
               <a:rPr lang="en-US" smtClean="0"/>
-              <a:t>10/4/23</a:t>
+              <a:t>2/9/24</a:t>
             </a:fld>
             <a:endParaRPr lang="en-US"/>
           </a:p>
@@ -1249,7 +1249,7 @@
           <a:p>
             <a:fld id="{964302DC-9F53-934F-AE4D-0F1F197008C1}" type="datetimeFigureOut">
               <a:rPr lang="en-US" smtClean="0"/>
-              <a:t>10/4/23</a:t>
+              <a:t>2/9/24</a:t>
             </a:fld>
             <a:endParaRPr lang="en-US"/>
           </a:p>
@@ -1616,7 +1616,7 @@
           <a:p>
             <a:fld id="{964302DC-9F53-934F-AE4D-0F1F197008C1}" type="datetimeFigureOut">
               <a:rPr lang="en-US" smtClean="0"/>
-              <a:t>10/4/23</a:t>
+              <a:t>2/9/24</a:t>
             </a:fld>
             <a:endParaRPr lang="en-US"/>
           </a:p>
@@ -1734,7 +1734,7 @@
           <a:p>
             <a:fld id="{964302DC-9F53-934F-AE4D-0F1F197008C1}" type="datetimeFigureOut">
               <a:rPr lang="en-US" smtClean="0"/>
-              <a:t>10/4/23</a:t>
+              <a:t>2/9/24</a:t>
             </a:fld>
             <a:endParaRPr lang="en-US"/>
           </a:p>
@@ -1829,7 +1829,7 @@
           <a:p>
             <a:fld id="{964302DC-9F53-934F-AE4D-0F1F197008C1}" type="datetimeFigureOut">
               <a:rPr lang="en-US" smtClean="0"/>
-              <a:t>10/4/23</a:t>
+              <a:t>2/9/24</a:t>
             </a:fld>
             <a:endParaRPr lang="en-US"/>
           </a:p>
@@ -2106,7 +2106,7 @@
           <a:p>
             <a:fld id="{964302DC-9F53-934F-AE4D-0F1F197008C1}" type="datetimeFigureOut">
               <a:rPr lang="en-US" smtClean="0"/>
-              <a:t>10/4/23</a:t>
+              <a:t>2/9/24</a:t>
             </a:fld>
             <a:endParaRPr lang="en-US"/>
           </a:p>
@@ -2363,7 +2363,7 @@
           <a:p>
             <a:fld id="{964302DC-9F53-934F-AE4D-0F1F197008C1}" type="datetimeFigureOut">
               <a:rPr lang="en-US" smtClean="0"/>
-              <a:t>10/4/23</a:t>
+              <a:t>2/9/24</a:t>
             </a:fld>
             <a:endParaRPr lang="en-US"/>
           </a:p>
@@ -2428,9 +2428,18 @@
 <p:sldMaster xmlns:a="http://schemas.openxmlformats.org/drawingml/2006/main" xmlns:r="http://schemas.openxmlformats.org/officeDocument/2006/relationships" xmlns:p="http://schemas.openxmlformats.org/presentationml/2006/main">
   <p:cSld>
     <p:bg>
-      <p:bgRef idx="1001">
-        <a:schemeClr val="bg1"/>
-      </p:bgRef>
+      <p:bgPr>
+        <a:blipFill dpi="0" rotWithShape="1">
+          <a:blip r:embed="rId13">
+            <a:lum/>
+          </a:blip>
+          <a:srcRect/>
+          <a:stretch>
+            <a:fillRect/>
+          </a:stretch>
+        </a:blipFill>
+        <a:effectLst/>
+      </p:bgPr>
     </p:bg>
     <p:spTree>
       <p:nvGrpSpPr>
@@ -2576,7 +2585,7 @@
           <a:p>
             <a:fld id="{964302DC-9F53-934F-AE4D-0F1F197008C1}" type="datetimeFigureOut">
               <a:rPr lang="en-US" smtClean="0"/>
-              <a:t>10/4/23</a:t>
+              <a:t>2/9/24</a:t>
             </a:fld>
             <a:endParaRPr lang="en-US"/>
           </a:p>
@@ -2967,20 +2976,6 @@
 <file path=ppt/slides/slide1.xml><?xml version="1.0" encoding="utf-8"?>
 <p:sld xmlns:a="http://schemas.openxmlformats.org/drawingml/2006/main" xmlns:r="http://schemas.openxmlformats.org/officeDocument/2006/relationships" xmlns:p="http://schemas.openxmlformats.org/presentationml/2006/main">
   <p:cSld>
-    <p:bg>
-      <p:bgPr>
-        <a:blipFill dpi="0" rotWithShape="1">
-          <a:blip r:embed="rId2">
-            <a:lum/>
-          </a:blip>
-          <a:srcRect/>
-          <a:stretch>
-            <a:fillRect/>
-          </a:stretch>
-        </a:blipFill>
-        <a:effectLst/>
-      </p:bgPr>
-    </p:bg>
     <p:spTree>
       <p:nvGrpSpPr>
         <p:cNvPr id="1" name=""/>
@@ -3280,7 +3275,7 @@
               <p:nvPr/>
             </p:nvPicPr>
             <p:blipFill>
-              <a:blip r:embed="rId3">
+              <a:blip r:embed="rId2">
                 <a:alphaModFix amt="30000"/>
               </a:blip>
               <a:stretch>
@@ -5371,7 +5366,7 @@
             <p:nvPr/>
           </p:nvPicPr>
           <p:blipFill>
-            <a:blip r:embed="rId4">
+            <a:blip r:embed="rId3">
               <a:alphaModFix amt="30000"/>
             </a:blip>
             <a:stretch>
@@ -5460,272 +5455,6 @@
               <a:r>
                 <a:rPr lang="en-US" dirty="0"/>
                 <a:t>10</a:t>
-              </a:r>
-            </a:p>
-          </p:txBody>
-        </p:sp>
-        <p:sp>
-          <p:nvSpPr>
-            <p:cNvPr id="9" name="Rectangle 8">
-              <a:extLst>
-                <a:ext uri="{FF2B5EF4-FFF2-40B4-BE49-F238E27FC236}">
-                  <a16:creationId xmlns:a16="http://schemas.microsoft.com/office/drawing/2014/main" id="{5DC39B20-F863-7C67-FD78-60CFCC23A0E8}"/>
-                </a:ext>
-              </a:extLst>
-            </p:cNvPr>
-            <p:cNvSpPr/>
-            <p:nvPr/>
-          </p:nvSpPr>
-          <p:spPr>
-            <a:xfrm>
-              <a:off x="5034017" y="-2432404"/>
-              <a:ext cx="2127795" cy="1085065"/>
-            </a:xfrm>
-            <a:custGeom>
-              <a:avLst/>
-              <a:gdLst>
-                <a:gd name="connsiteX0" fmla="*/ 0 w 2127795"/>
-                <a:gd name="connsiteY0" fmla="*/ 0 h 1085065"/>
-                <a:gd name="connsiteX1" fmla="*/ 510671 w 2127795"/>
-                <a:gd name="connsiteY1" fmla="*/ 0 h 1085065"/>
-                <a:gd name="connsiteX2" fmla="*/ 1042620 w 2127795"/>
-                <a:gd name="connsiteY2" fmla="*/ 0 h 1085065"/>
-                <a:gd name="connsiteX3" fmla="*/ 1595846 w 2127795"/>
-                <a:gd name="connsiteY3" fmla="*/ 0 h 1085065"/>
-                <a:gd name="connsiteX4" fmla="*/ 2127795 w 2127795"/>
-                <a:gd name="connsiteY4" fmla="*/ 0 h 1085065"/>
-                <a:gd name="connsiteX5" fmla="*/ 2127795 w 2127795"/>
-                <a:gd name="connsiteY5" fmla="*/ 553383 h 1085065"/>
-                <a:gd name="connsiteX6" fmla="*/ 2127795 w 2127795"/>
-                <a:gd name="connsiteY6" fmla="*/ 1085065 h 1085065"/>
-                <a:gd name="connsiteX7" fmla="*/ 1553290 w 2127795"/>
-                <a:gd name="connsiteY7" fmla="*/ 1085065 h 1085065"/>
-                <a:gd name="connsiteX8" fmla="*/ 978786 w 2127795"/>
-                <a:gd name="connsiteY8" fmla="*/ 1085065 h 1085065"/>
-                <a:gd name="connsiteX9" fmla="*/ 0 w 2127795"/>
-                <a:gd name="connsiteY9" fmla="*/ 1085065 h 1085065"/>
-                <a:gd name="connsiteX10" fmla="*/ 0 w 2127795"/>
-                <a:gd name="connsiteY10" fmla="*/ 553383 h 1085065"/>
-                <a:gd name="connsiteX11" fmla="*/ 0 w 2127795"/>
-                <a:gd name="connsiteY11" fmla="*/ 0 h 1085065"/>
-              </a:gdLst>
-              <a:ahLst/>
-              <a:cxnLst>
-                <a:cxn ang="0">
-                  <a:pos x="connsiteX0" y="connsiteY0"/>
-                </a:cxn>
-                <a:cxn ang="0">
-                  <a:pos x="connsiteX1" y="connsiteY1"/>
-                </a:cxn>
-                <a:cxn ang="0">
-                  <a:pos x="connsiteX2" y="connsiteY2"/>
-                </a:cxn>
-                <a:cxn ang="0">
-                  <a:pos x="connsiteX3" y="connsiteY3"/>
-                </a:cxn>
-                <a:cxn ang="0">
-                  <a:pos x="connsiteX4" y="connsiteY4"/>
-                </a:cxn>
-                <a:cxn ang="0">
-                  <a:pos x="connsiteX5" y="connsiteY5"/>
-                </a:cxn>
-                <a:cxn ang="0">
-                  <a:pos x="connsiteX6" y="connsiteY6"/>
-                </a:cxn>
-                <a:cxn ang="0">
-                  <a:pos x="connsiteX7" y="connsiteY7"/>
-                </a:cxn>
-                <a:cxn ang="0">
-                  <a:pos x="connsiteX8" y="connsiteY8"/>
-                </a:cxn>
-                <a:cxn ang="0">
-                  <a:pos x="connsiteX9" y="connsiteY9"/>
-                </a:cxn>
-                <a:cxn ang="0">
-                  <a:pos x="connsiteX10" y="connsiteY10"/>
-                </a:cxn>
-                <a:cxn ang="0">
-                  <a:pos x="connsiteX11" y="connsiteY11"/>
-                </a:cxn>
-              </a:cxnLst>
-              <a:rect l="l" t="t" r="r" b="b"/>
-              <a:pathLst>
-                <a:path w="2127795" h="1085065" fill="none" extrusionOk="0">
-                  <a:moveTo>
-                    <a:pt x="0" y="0"/>
-                  </a:moveTo>
-                  <a:cubicBezTo>
-                    <a:pt x="119302" y="-23815"/>
-                    <a:pt x="321953" y="-4268"/>
-                    <a:pt x="510671" y="0"/>
-                  </a:cubicBezTo>
-                  <a:cubicBezTo>
-                    <a:pt x="699389" y="4268"/>
-                    <a:pt x="838038" y="-4296"/>
-                    <a:pt x="1042620" y="0"/>
-                  </a:cubicBezTo>
-                  <a:cubicBezTo>
-                    <a:pt x="1247202" y="4296"/>
-                    <a:pt x="1418238" y="-20161"/>
-                    <a:pt x="1595846" y="0"/>
-                  </a:cubicBezTo>
-                  <a:cubicBezTo>
-                    <a:pt x="1773454" y="20161"/>
-                    <a:pt x="1930348" y="288"/>
-                    <a:pt x="2127795" y="0"/>
-                  </a:cubicBezTo>
-                  <a:cubicBezTo>
-                    <a:pt x="2127420" y="271704"/>
-                    <a:pt x="2137858" y="397892"/>
-                    <a:pt x="2127795" y="553383"/>
-                  </a:cubicBezTo>
-                  <a:cubicBezTo>
-                    <a:pt x="2117732" y="708874"/>
-                    <a:pt x="2106280" y="956975"/>
-                    <a:pt x="2127795" y="1085065"/>
-                  </a:cubicBezTo>
-                  <a:cubicBezTo>
-                    <a:pt x="1890946" y="1101697"/>
-                    <a:pt x="1709293" y="1081968"/>
-                    <a:pt x="1553290" y="1085065"/>
-                  </a:cubicBezTo>
-                  <a:cubicBezTo>
-                    <a:pt x="1397287" y="1088162"/>
-                    <a:pt x="1242166" y="1089720"/>
-                    <a:pt x="978786" y="1085065"/>
-                  </a:cubicBezTo>
-                  <a:cubicBezTo>
-                    <a:pt x="715406" y="1080410"/>
-                    <a:pt x="281211" y="1084892"/>
-                    <a:pt x="0" y="1085065"/>
-                  </a:cubicBezTo>
-                  <a:cubicBezTo>
-                    <a:pt x="-13849" y="960040"/>
-                    <a:pt x="-19899" y="725067"/>
-                    <a:pt x="0" y="553383"/>
-                  </a:cubicBezTo>
-                  <a:cubicBezTo>
-                    <a:pt x="19899" y="381699"/>
-                    <a:pt x="-3693" y="272116"/>
-                    <a:pt x="0" y="0"/>
-                  </a:cubicBezTo>
-                  <a:close/>
-                </a:path>
-                <a:path w="2127795" h="1085065" stroke="0" extrusionOk="0">
-                  <a:moveTo>
-                    <a:pt x="0" y="0"/>
-                  </a:moveTo>
-                  <a:cubicBezTo>
-                    <a:pt x="171248" y="-8495"/>
-                    <a:pt x="325453" y="21877"/>
-                    <a:pt x="510671" y="0"/>
-                  </a:cubicBezTo>
-                  <a:cubicBezTo>
-                    <a:pt x="695889" y="-21877"/>
-                    <a:pt x="802356" y="-16277"/>
-                    <a:pt x="978786" y="0"/>
-                  </a:cubicBezTo>
-                  <a:cubicBezTo>
-                    <a:pt x="1155217" y="16277"/>
-                    <a:pt x="1321550" y="15209"/>
-                    <a:pt x="1553290" y="0"/>
-                  </a:cubicBezTo>
-                  <a:cubicBezTo>
-                    <a:pt x="1785030" y="-15209"/>
-                    <a:pt x="1999571" y="-24705"/>
-                    <a:pt x="2127795" y="0"/>
-                  </a:cubicBezTo>
-                  <a:cubicBezTo>
-                    <a:pt x="2106315" y="169500"/>
-                    <a:pt x="2151273" y="285308"/>
-                    <a:pt x="2127795" y="531682"/>
-                  </a:cubicBezTo>
-                  <a:cubicBezTo>
-                    <a:pt x="2104317" y="778056"/>
-                    <a:pt x="2118403" y="967639"/>
-                    <a:pt x="2127795" y="1085065"/>
-                  </a:cubicBezTo>
-                  <a:cubicBezTo>
-                    <a:pt x="1970448" y="1066755"/>
-                    <a:pt x="1767058" y="1074801"/>
-                    <a:pt x="1595846" y="1085065"/>
-                  </a:cubicBezTo>
-                  <a:cubicBezTo>
-                    <a:pt x="1424634" y="1095329"/>
-                    <a:pt x="1144488" y="1080688"/>
-                    <a:pt x="1021342" y="1085065"/>
-                  </a:cubicBezTo>
-                  <a:cubicBezTo>
-                    <a:pt x="898196" y="1089442"/>
-                    <a:pt x="704334" y="1073542"/>
-                    <a:pt x="553227" y="1085065"/>
-                  </a:cubicBezTo>
-                  <a:cubicBezTo>
-                    <a:pt x="402121" y="1096588"/>
-                    <a:pt x="151220" y="1095466"/>
-                    <a:pt x="0" y="1085065"/>
-                  </a:cubicBezTo>
-                  <a:cubicBezTo>
-                    <a:pt x="21856" y="935562"/>
-                    <a:pt x="-26363" y="762075"/>
-                    <a:pt x="0" y="542533"/>
-                  </a:cubicBezTo>
-                  <a:cubicBezTo>
-                    <a:pt x="26363" y="322991"/>
-                    <a:pt x="24427" y="211558"/>
-                    <a:pt x="0" y="0"/>
-                  </a:cubicBezTo>
-                  <a:close/>
-                </a:path>
-              </a:pathLst>
-            </a:custGeom>
-            <a:solidFill>
-              <a:schemeClr val="accent4">
-                <a:lumMod val="60000"/>
-                <a:lumOff val="40000"/>
-              </a:schemeClr>
-            </a:solidFill>
-            <a:ln w="12700">
-              <a:solidFill>
-                <a:schemeClr val="tx1"/>
-              </a:solidFill>
-              <a:extLst>
-                <a:ext uri="{C807C97D-BFC1-408E-A445-0C87EB9F89A2}">
-                  <ask:lineSketchStyleProps xmlns:ask="http://schemas.microsoft.com/office/drawing/2018/sketchyshapes" sd="1219033472">
-                    <a:prstGeom prst="rect">
-                      <a:avLst/>
-                    </a:prstGeom>
-                    <ask:type>
-                      <ask:lineSketchFreehand/>
-                    </ask:type>
-                  </ask:lineSketchStyleProps>
-                </a:ext>
-              </a:extLst>
-            </a:ln>
-            <a:effectLst/>
-          </p:spPr>
-          <p:style>
-            <a:lnRef idx="1">
-              <a:schemeClr val="accent4"/>
-            </a:lnRef>
-            <a:fillRef idx="2">
-              <a:schemeClr val="accent4"/>
-            </a:fillRef>
-            <a:effectRef idx="1">
-              <a:schemeClr val="accent4"/>
-            </a:effectRef>
-            <a:fontRef idx="minor">
-              <a:schemeClr val="dk1"/>
-            </a:fontRef>
-          </p:style>
-          <p:txBody>
-            <a:bodyPr rtlCol="0" anchor="ctr"/>
-            <a:lstStyle/>
-            <a:p>
-              <a:pPr algn="ctr"/>
-              <a:r>
-                <a:rPr lang="en-US" sz="1600" dirty="0"/>
-                <a:t>A while loop which counts up to (but not including) a user input value </a:t>
               </a:r>
             </a:p>
           </p:txBody>
@@ -5903,20 +5632,6 @@
 <file path=ppt/slides/slide10.xml><?xml version="1.0" encoding="utf-8"?>
 <p:sld xmlns:a="http://schemas.openxmlformats.org/drawingml/2006/main" xmlns:r="http://schemas.openxmlformats.org/officeDocument/2006/relationships" xmlns:p="http://schemas.openxmlformats.org/presentationml/2006/main">
   <p:cSld>
-    <p:bg>
-      <p:bgPr>
-        <a:blipFill dpi="0" rotWithShape="1">
-          <a:blip r:embed="rId2">
-            <a:lum/>
-          </a:blip>
-          <a:srcRect/>
-          <a:stretch>
-            <a:fillRect/>
-          </a:stretch>
-        </a:blipFill>
-        <a:effectLst/>
-      </p:bgPr>
-    </p:bg>
     <p:spTree>
       <p:nvGrpSpPr>
         <p:cNvPr id="1" name=""/>
@@ -6092,7 +5807,7 @@
                     </a:schemeClr>
                   </a:solidFill>
                 </a:rPr>
-                <a:t>  WriteLine(</a:t>
+                <a:t>    WriteLine(</a:t>
               </a:r>
               <a:r>
                 <a:rPr lang="en-AU" sz="1600" dirty="0" err="1">
@@ -6122,7 +5837,7 @@
               </a:pPr>
               <a:r>
                 <a:rPr lang="en-AU" sz="1600" dirty="0"/>
-                <a:t>  </a:t>
+                <a:t>    </a:t>
               </a:r>
               <a:r>
                 <a:rPr lang="en-AU" sz="1600" dirty="0" err="1"/>
@@ -6187,7 +5902,7 @@
               <p:nvPr/>
             </p:nvPicPr>
             <p:blipFill>
-              <a:blip r:embed="rId3">
+              <a:blip r:embed="rId2">
                 <a:alphaModFix amt="30000"/>
               </a:blip>
               <a:stretch>
@@ -7981,7 +7696,7 @@
             <p:nvPr/>
           </p:nvPicPr>
           <p:blipFill>
-            <a:blip r:embed="rId4">
+            <a:blip r:embed="rId3">
               <a:alphaModFix amt="30000"/>
             </a:blip>
             <a:stretch>
@@ -8825,280 +8540,6 @@
       </p:sp>
       <p:sp>
         <p:nvSpPr>
-          <p:cNvPr id="49" name="Rectangle 48">
-            <a:extLst>
-              <a:ext uri="{FF2B5EF4-FFF2-40B4-BE49-F238E27FC236}">
-                <a16:creationId xmlns:a16="http://schemas.microsoft.com/office/drawing/2014/main" id="{3F481BBB-69F5-29C3-45DB-01CA5D3A5F04}"/>
-              </a:ext>
-            </a:extLst>
-          </p:cNvPr>
-          <p:cNvSpPr/>
-          <p:nvPr/>
-        </p:nvSpPr>
-        <p:spPr>
-          <a:xfrm>
-            <a:off x="5031789" y="676094"/>
-            <a:ext cx="2127795" cy="1085065"/>
-          </a:xfrm>
-          <a:custGeom>
-            <a:avLst/>
-            <a:gdLst>
-              <a:gd name="connsiteX0" fmla="*/ 0 w 2127795"/>
-              <a:gd name="connsiteY0" fmla="*/ 0 h 1085065"/>
-              <a:gd name="connsiteX1" fmla="*/ 510671 w 2127795"/>
-              <a:gd name="connsiteY1" fmla="*/ 0 h 1085065"/>
-              <a:gd name="connsiteX2" fmla="*/ 1042620 w 2127795"/>
-              <a:gd name="connsiteY2" fmla="*/ 0 h 1085065"/>
-              <a:gd name="connsiteX3" fmla="*/ 1595846 w 2127795"/>
-              <a:gd name="connsiteY3" fmla="*/ 0 h 1085065"/>
-              <a:gd name="connsiteX4" fmla="*/ 2127795 w 2127795"/>
-              <a:gd name="connsiteY4" fmla="*/ 0 h 1085065"/>
-              <a:gd name="connsiteX5" fmla="*/ 2127795 w 2127795"/>
-              <a:gd name="connsiteY5" fmla="*/ 553383 h 1085065"/>
-              <a:gd name="connsiteX6" fmla="*/ 2127795 w 2127795"/>
-              <a:gd name="connsiteY6" fmla="*/ 1085065 h 1085065"/>
-              <a:gd name="connsiteX7" fmla="*/ 1553290 w 2127795"/>
-              <a:gd name="connsiteY7" fmla="*/ 1085065 h 1085065"/>
-              <a:gd name="connsiteX8" fmla="*/ 978786 w 2127795"/>
-              <a:gd name="connsiteY8" fmla="*/ 1085065 h 1085065"/>
-              <a:gd name="connsiteX9" fmla="*/ 0 w 2127795"/>
-              <a:gd name="connsiteY9" fmla="*/ 1085065 h 1085065"/>
-              <a:gd name="connsiteX10" fmla="*/ 0 w 2127795"/>
-              <a:gd name="connsiteY10" fmla="*/ 553383 h 1085065"/>
-              <a:gd name="connsiteX11" fmla="*/ 0 w 2127795"/>
-              <a:gd name="connsiteY11" fmla="*/ 0 h 1085065"/>
-            </a:gdLst>
-            <a:ahLst/>
-            <a:cxnLst>
-              <a:cxn ang="0">
-                <a:pos x="connsiteX0" y="connsiteY0"/>
-              </a:cxn>
-              <a:cxn ang="0">
-                <a:pos x="connsiteX1" y="connsiteY1"/>
-              </a:cxn>
-              <a:cxn ang="0">
-                <a:pos x="connsiteX2" y="connsiteY2"/>
-              </a:cxn>
-              <a:cxn ang="0">
-                <a:pos x="connsiteX3" y="connsiteY3"/>
-              </a:cxn>
-              <a:cxn ang="0">
-                <a:pos x="connsiteX4" y="connsiteY4"/>
-              </a:cxn>
-              <a:cxn ang="0">
-                <a:pos x="connsiteX5" y="connsiteY5"/>
-              </a:cxn>
-              <a:cxn ang="0">
-                <a:pos x="connsiteX6" y="connsiteY6"/>
-              </a:cxn>
-              <a:cxn ang="0">
-                <a:pos x="connsiteX7" y="connsiteY7"/>
-              </a:cxn>
-              <a:cxn ang="0">
-                <a:pos x="connsiteX8" y="connsiteY8"/>
-              </a:cxn>
-              <a:cxn ang="0">
-                <a:pos x="connsiteX9" y="connsiteY9"/>
-              </a:cxn>
-              <a:cxn ang="0">
-                <a:pos x="connsiteX10" y="connsiteY10"/>
-              </a:cxn>
-              <a:cxn ang="0">
-                <a:pos x="connsiteX11" y="connsiteY11"/>
-              </a:cxn>
-            </a:cxnLst>
-            <a:rect l="l" t="t" r="r" b="b"/>
-            <a:pathLst>
-              <a:path w="2127795" h="1085065" fill="none" extrusionOk="0">
-                <a:moveTo>
-                  <a:pt x="0" y="0"/>
-                </a:moveTo>
-                <a:cubicBezTo>
-                  <a:pt x="119302" y="-23815"/>
-                  <a:pt x="321953" y="-4268"/>
-                  <a:pt x="510671" y="0"/>
-                </a:cubicBezTo>
-                <a:cubicBezTo>
-                  <a:pt x="699389" y="4268"/>
-                  <a:pt x="838038" y="-4296"/>
-                  <a:pt x="1042620" y="0"/>
-                </a:cubicBezTo>
-                <a:cubicBezTo>
-                  <a:pt x="1247202" y="4296"/>
-                  <a:pt x="1418238" y="-20161"/>
-                  <a:pt x="1595846" y="0"/>
-                </a:cubicBezTo>
-                <a:cubicBezTo>
-                  <a:pt x="1773454" y="20161"/>
-                  <a:pt x="1930348" y="288"/>
-                  <a:pt x="2127795" y="0"/>
-                </a:cubicBezTo>
-                <a:cubicBezTo>
-                  <a:pt x="2127420" y="271704"/>
-                  <a:pt x="2137858" y="397892"/>
-                  <a:pt x="2127795" y="553383"/>
-                </a:cubicBezTo>
-                <a:cubicBezTo>
-                  <a:pt x="2117732" y="708874"/>
-                  <a:pt x="2106280" y="956975"/>
-                  <a:pt x="2127795" y="1085065"/>
-                </a:cubicBezTo>
-                <a:cubicBezTo>
-                  <a:pt x="1890946" y="1101697"/>
-                  <a:pt x="1709293" y="1081968"/>
-                  <a:pt x="1553290" y="1085065"/>
-                </a:cubicBezTo>
-                <a:cubicBezTo>
-                  <a:pt x="1397287" y="1088162"/>
-                  <a:pt x="1242166" y="1089720"/>
-                  <a:pt x="978786" y="1085065"/>
-                </a:cubicBezTo>
-                <a:cubicBezTo>
-                  <a:pt x="715406" y="1080410"/>
-                  <a:pt x="281211" y="1084892"/>
-                  <a:pt x="0" y="1085065"/>
-                </a:cubicBezTo>
-                <a:cubicBezTo>
-                  <a:pt x="-13849" y="960040"/>
-                  <a:pt x="-19899" y="725067"/>
-                  <a:pt x="0" y="553383"/>
-                </a:cubicBezTo>
-                <a:cubicBezTo>
-                  <a:pt x="19899" y="381699"/>
-                  <a:pt x="-3693" y="272116"/>
-                  <a:pt x="0" y="0"/>
-                </a:cubicBezTo>
-                <a:close/>
-              </a:path>
-              <a:path w="2127795" h="1085065" stroke="0" extrusionOk="0">
-                <a:moveTo>
-                  <a:pt x="0" y="0"/>
-                </a:moveTo>
-                <a:cubicBezTo>
-                  <a:pt x="171248" y="-8495"/>
-                  <a:pt x="325453" y="21877"/>
-                  <a:pt x="510671" y="0"/>
-                </a:cubicBezTo>
-                <a:cubicBezTo>
-                  <a:pt x="695889" y="-21877"/>
-                  <a:pt x="802356" y="-16277"/>
-                  <a:pt x="978786" y="0"/>
-                </a:cubicBezTo>
-                <a:cubicBezTo>
-                  <a:pt x="1155217" y="16277"/>
-                  <a:pt x="1321550" y="15209"/>
-                  <a:pt x="1553290" y="0"/>
-                </a:cubicBezTo>
-                <a:cubicBezTo>
-                  <a:pt x="1785030" y="-15209"/>
-                  <a:pt x="1999571" y="-24705"/>
-                  <a:pt x="2127795" y="0"/>
-                </a:cubicBezTo>
-                <a:cubicBezTo>
-                  <a:pt x="2106315" y="169500"/>
-                  <a:pt x="2151273" y="285308"/>
-                  <a:pt x="2127795" y="531682"/>
-                </a:cubicBezTo>
-                <a:cubicBezTo>
-                  <a:pt x="2104317" y="778056"/>
-                  <a:pt x="2118403" y="967639"/>
-                  <a:pt x="2127795" y="1085065"/>
-                </a:cubicBezTo>
-                <a:cubicBezTo>
-                  <a:pt x="1970448" y="1066755"/>
-                  <a:pt x="1767058" y="1074801"/>
-                  <a:pt x="1595846" y="1085065"/>
-                </a:cubicBezTo>
-                <a:cubicBezTo>
-                  <a:pt x="1424634" y="1095329"/>
-                  <a:pt x="1144488" y="1080688"/>
-                  <a:pt x="1021342" y="1085065"/>
-                </a:cubicBezTo>
-                <a:cubicBezTo>
-                  <a:pt x="898196" y="1089442"/>
-                  <a:pt x="704334" y="1073542"/>
-                  <a:pt x="553227" y="1085065"/>
-                </a:cubicBezTo>
-                <a:cubicBezTo>
-                  <a:pt x="402121" y="1096588"/>
-                  <a:pt x="151220" y="1095466"/>
-                  <a:pt x="0" y="1085065"/>
-                </a:cubicBezTo>
-                <a:cubicBezTo>
-                  <a:pt x="21856" y="935562"/>
-                  <a:pt x="-26363" y="762075"/>
-                  <a:pt x="0" y="542533"/>
-                </a:cubicBezTo>
-                <a:cubicBezTo>
-                  <a:pt x="26363" y="322991"/>
-                  <a:pt x="24427" y="211558"/>
-                  <a:pt x="0" y="0"/>
-                </a:cubicBezTo>
-                <a:close/>
-              </a:path>
-            </a:pathLst>
-          </a:custGeom>
-          <a:solidFill>
-            <a:schemeClr val="accent4">
-              <a:lumMod val="60000"/>
-              <a:lumOff val="40000"/>
-            </a:schemeClr>
-          </a:solidFill>
-          <a:ln w="12700">
-            <a:solidFill>
-              <a:schemeClr val="tx1"/>
-            </a:solidFill>
-            <a:extLst>
-              <a:ext uri="{C807C97D-BFC1-408E-A445-0C87EB9F89A2}">
-                <ask:lineSketchStyleProps xmlns:ask="http://schemas.microsoft.com/office/drawing/2018/sketchyshapes" sd="1219033472">
-                  <a:prstGeom prst="rect">
-                    <a:avLst/>
-                  </a:prstGeom>
-                  <ask:type>
-                    <ask:lineSketchFreehand/>
-                  </ask:type>
-                </ask:lineSketchStyleProps>
-              </a:ext>
-            </a:extLst>
-          </a:ln>
-          <a:effectLst/>
-        </p:spPr>
-        <p:style>
-          <a:lnRef idx="1">
-            <a:schemeClr val="accent4"/>
-          </a:lnRef>
-          <a:fillRef idx="2">
-            <a:schemeClr val="accent4"/>
-          </a:fillRef>
-          <a:effectRef idx="1">
-            <a:schemeClr val="accent4"/>
-          </a:effectRef>
-          <a:fontRef idx="minor">
-            <a:schemeClr val="dk1"/>
-          </a:fontRef>
-        </p:style>
-        <p:txBody>
-          <a:bodyPr rtlCol="0" anchor="ctr"/>
-          <a:lstStyle/>
-          <a:p>
-            <a:pPr algn="ctr"/>
-            <a:r>
-              <a:rPr lang="en-US" sz="1600" dirty="0"/>
-              <a:t>Let’s jump ahead to where </a:t>
-            </a:r>
-            <a:r>
-              <a:rPr lang="en-US" sz="1600" dirty="0" err="1"/>
-              <a:t>i</a:t>
-            </a:r>
-            <a:r>
-              <a:rPr lang="en-US" sz="1600" dirty="0"/>
-              <a:t> has just been incremented to 10</a:t>
-            </a:r>
-          </a:p>
-        </p:txBody>
-      </p:sp>
-      <p:sp>
-        <p:nvSpPr>
           <p:cNvPr id="69" name="TextBox 68">
             <a:extLst>
               <a:ext uri="{FF2B5EF4-FFF2-40B4-BE49-F238E27FC236}">
@@ -9223,20 +8664,6 @@
 <file path=ppt/slides/slide11.xml><?xml version="1.0" encoding="utf-8"?>
 <p:sld xmlns:a="http://schemas.openxmlformats.org/drawingml/2006/main" xmlns:r="http://schemas.openxmlformats.org/officeDocument/2006/relationships" xmlns:p="http://schemas.openxmlformats.org/presentationml/2006/main">
   <p:cSld>
-    <p:bg>
-      <p:bgPr>
-        <a:blipFill dpi="0" rotWithShape="1">
-          <a:blip r:embed="rId2">
-            <a:lum/>
-          </a:blip>
-          <a:srcRect/>
-          <a:stretch>
-            <a:fillRect/>
-          </a:stretch>
-        </a:blipFill>
-        <a:effectLst/>
-      </p:bgPr>
-    </p:bg>
     <p:spTree>
       <p:nvGrpSpPr>
         <p:cNvPr id="1" name=""/>
@@ -9394,7 +8821,7 @@
                     </a:schemeClr>
                   </a:solidFill>
                 </a:rPr>
-                <a:t>  WriteLine(</a:t>
+                <a:t>    WriteLine(</a:t>
               </a:r>
               <a:r>
                 <a:rPr lang="en-AU" sz="1600" dirty="0" err="1">
@@ -9430,7 +8857,7 @@
                     </a:schemeClr>
                   </a:solidFill>
                 </a:rPr>
-                <a:t>  </a:t>
+                <a:t>    </a:t>
               </a:r>
               <a:r>
                 <a:rPr lang="en-AU" sz="1600" dirty="0" err="1">
@@ -9507,7 +8934,7 @@
               <p:nvPr/>
             </p:nvPicPr>
             <p:blipFill>
-              <a:blip r:embed="rId3">
+              <a:blip r:embed="rId2">
                 <a:alphaModFix amt="30000"/>
               </a:blip>
               <a:stretch>
@@ -11301,7 +10728,7 @@
             <p:nvPr/>
           </p:nvPicPr>
           <p:blipFill>
-            <a:blip r:embed="rId4">
+            <a:blip r:embed="rId3">
               <a:alphaModFix amt="30000"/>
             </a:blip>
             <a:stretch>
@@ -12116,20 +11543,6 @@
 <file path=ppt/slides/slide2.xml><?xml version="1.0" encoding="utf-8"?>
 <p:sld xmlns:a="http://schemas.openxmlformats.org/drawingml/2006/main" xmlns:r="http://schemas.openxmlformats.org/officeDocument/2006/relationships" xmlns:p="http://schemas.openxmlformats.org/presentationml/2006/main">
   <p:cSld>
-    <p:bg>
-      <p:bgPr>
-        <a:blipFill dpi="0" rotWithShape="1">
-          <a:blip r:embed="rId2">
-            <a:lum/>
-          </a:blip>
-          <a:srcRect/>
-          <a:stretch>
-            <a:fillRect/>
-          </a:stretch>
-        </a:blipFill>
-        <a:effectLst/>
-      </p:bgPr>
-    </p:bg>
     <p:spTree>
       <p:nvGrpSpPr>
         <p:cNvPr id="1" name=""/>
@@ -12287,7 +11700,7 @@
                     </a:schemeClr>
                   </a:solidFill>
                 </a:rPr>
-                <a:t>  WriteLine(</a:t>
+                <a:t>    WriteLine(</a:t>
               </a:r>
               <a:r>
                 <a:rPr lang="en-AU" sz="1600" dirty="0" err="1">
@@ -12323,7 +11736,7 @@
                     </a:schemeClr>
                   </a:solidFill>
                 </a:rPr>
-                <a:t>  </a:t>
+                <a:t>    </a:t>
               </a:r>
               <a:r>
                 <a:rPr lang="en-AU" sz="1600" dirty="0" err="1">
@@ -12400,7 +11813,7 @@
               <p:nvPr/>
             </p:nvPicPr>
             <p:blipFill>
-              <a:blip r:embed="rId3">
+              <a:blip r:embed="rId2">
                 <a:alphaModFix amt="30000"/>
               </a:blip>
               <a:stretch>
@@ -14513,7 +13926,7 @@
             <p:nvPr/>
           </p:nvPicPr>
           <p:blipFill>
-            <a:blip r:embed="rId4">
+            <a:blip r:embed="rId3">
               <a:alphaModFix amt="30000"/>
             </a:blip>
             <a:stretch>
@@ -15040,20 +14453,6 @@
 <file path=ppt/slides/slide3.xml><?xml version="1.0" encoding="utf-8"?>
 <p:sld xmlns:a="http://schemas.openxmlformats.org/drawingml/2006/main" xmlns:r="http://schemas.openxmlformats.org/officeDocument/2006/relationships" xmlns:p="http://schemas.openxmlformats.org/presentationml/2006/main">
   <p:cSld>
-    <p:bg>
-      <p:bgPr>
-        <a:blipFill dpi="0" rotWithShape="1">
-          <a:blip r:embed="rId2">
-            <a:lum/>
-          </a:blip>
-          <a:srcRect/>
-          <a:stretch>
-            <a:fillRect/>
-          </a:stretch>
-        </a:blipFill>
-        <a:effectLst/>
-      </p:bgPr>
-    </p:bg>
     <p:spTree>
       <p:nvGrpSpPr>
         <p:cNvPr id="1" name=""/>
@@ -15211,7 +14610,7 @@
                     </a:schemeClr>
                   </a:solidFill>
                 </a:rPr>
-                <a:t>  WriteLine(</a:t>
+                <a:t>    WriteLine(</a:t>
               </a:r>
               <a:r>
                 <a:rPr lang="en-AU" sz="1600" dirty="0" err="1">
@@ -15247,7 +14646,7 @@
                     </a:schemeClr>
                   </a:solidFill>
                 </a:rPr>
-                <a:t>  </a:t>
+                <a:t>    </a:t>
               </a:r>
               <a:r>
                 <a:rPr lang="en-AU" sz="1600" dirty="0" err="1">
@@ -15324,7 +14723,7 @@
               <p:nvPr/>
             </p:nvPicPr>
             <p:blipFill>
-              <a:blip r:embed="rId3">
+              <a:blip r:embed="rId2">
                 <a:alphaModFix amt="30000"/>
               </a:blip>
               <a:stretch>
@@ -17423,7 +16822,7 @@
             <p:nvPr/>
           </p:nvPicPr>
           <p:blipFill>
-            <a:blip r:embed="rId4">
+            <a:blip r:embed="rId3">
               <a:alphaModFix amt="30000"/>
             </a:blip>
             <a:stretch>
@@ -17950,20 +17349,6 @@
 <file path=ppt/slides/slide4.xml><?xml version="1.0" encoding="utf-8"?>
 <p:sld xmlns:a="http://schemas.openxmlformats.org/drawingml/2006/main" xmlns:r="http://schemas.openxmlformats.org/officeDocument/2006/relationships" xmlns:p="http://schemas.openxmlformats.org/presentationml/2006/main">
   <p:cSld>
-    <p:bg>
-      <p:bgPr>
-        <a:blipFill dpi="0" rotWithShape="1">
-          <a:blip r:embed="rId2">
-            <a:lum/>
-          </a:blip>
-          <a:srcRect/>
-          <a:stretch>
-            <a:fillRect/>
-          </a:stretch>
-        </a:blipFill>
-        <a:effectLst/>
-      </p:bgPr>
-    </p:bg>
     <p:spTree>
       <p:nvGrpSpPr>
         <p:cNvPr id="1" name=""/>
@@ -18133,7 +17518,7 @@
                     </a:schemeClr>
                   </a:solidFill>
                 </a:rPr>
-                <a:t>  WriteLine(</a:t>
+                <a:t>    WriteLine(</a:t>
               </a:r>
               <a:r>
                 <a:rPr lang="en-AU" sz="1600" dirty="0" err="1">
@@ -18169,7 +17554,7 @@
                     </a:schemeClr>
                   </a:solidFill>
                 </a:rPr>
-                <a:t>  </a:t>
+                <a:t>    </a:t>
               </a:r>
               <a:r>
                 <a:rPr lang="en-AU" sz="1600" dirty="0" err="1">
@@ -18246,7 +17631,7 @@
               <p:nvPr/>
             </p:nvPicPr>
             <p:blipFill>
-              <a:blip r:embed="rId3">
+              <a:blip r:embed="rId2">
                 <a:alphaModFix amt="30000"/>
               </a:blip>
               <a:stretch>
@@ -20359,7 +19744,7 @@
             <p:nvPr/>
           </p:nvPicPr>
           <p:blipFill>
-            <a:blip r:embed="rId4">
+            <a:blip r:embed="rId3">
               <a:alphaModFix amt="30000"/>
             </a:blip>
             <a:stretch>
@@ -20910,20 +20295,6 @@
 <file path=ppt/slides/slide5.xml><?xml version="1.0" encoding="utf-8"?>
 <p:sld xmlns:a="http://schemas.openxmlformats.org/drawingml/2006/main" xmlns:r="http://schemas.openxmlformats.org/officeDocument/2006/relationships" xmlns:p="http://schemas.openxmlformats.org/presentationml/2006/main">
   <p:cSld>
-    <p:bg>
-      <p:bgPr>
-        <a:blipFill dpi="0" rotWithShape="1">
-          <a:blip r:embed="rId2">
-            <a:lum/>
-          </a:blip>
-          <a:srcRect/>
-          <a:stretch>
-            <a:fillRect/>
-          </a:stretch>
-        </a:blipFill>
-        <a:effectLst/>
-      </p:bgPr>
-    </p:bg>
     <p:spTree>
       <p:nvGrpSpPr>
         <p:cNvPr id="1" name=""/>
@@ -21093,7 +20464,7 @@
               </a:pPr>
               <a:r>
                 <a:rPr lang="en-AU" sz="1600" dirty="0"/>
-                <a:t>  WriteLine(</a:t>
+                <a:t>    WriteLine(</a:t>
               </a:r>
               <a:r>
                 <a:rPr lang="en-AU" sz="1600" dirty="0" err="1"/>
@@ -21117,7 +20488,7 @@
                     </a:schemeClr>
                   </a:solidFill>
                 </a:rPr>
-                <a:t>  </a:t>
+                <a:t>    </a:t>
               </a:r>
               <a:r>
                 <a:rPr lang="en-AU" sz="1600" dirty="0" err="1">
@@ -21194,7 +20565,7 @@
               <p:nvPr/>
             </p:nvPicPr>
             <p:blipFill>
-              <a:blip r:embed="rId3">
+              <a:blip r:embed="rId2">
                 <a:alphaModFix amt="30000"/>
               </a:blip>
               <a:stretch>
@@ -23031,7 +22402,7 @@
             <p:nvPr/>
           </p:nvPicPr>
           <p:blipFill>
-            <a:blip r:embed="rId4">
+            <a:blip r:embed="rId3">
               <a:alphaModFix amt="30000"/>
             </a:blip>
             <a:stretch>
@@ -23797,20 +23168,6 @@
 <file path=ppt/slides/slide6.xml><?xml version="1.0" encoding="utf-8"?>
 <p:sld xmlns:a="http://schemas.openxmlformats.org/drawingml/2006/main" xmlns:r="http://schemas.openxmlformats.org/officeDocument/2006/relationships" xmlns:p="http://schemas.openxmlformats.org/presentationml/2006/main">
   <p:cSld>
-    <p:bg>
-      <p:bgPr>
-        <a:blipFill dpi="0" rotWithShape="1">
-          <a:blip r:embed="rId2">
-            <a:lum/>
-          </a:blip>
-          <a:srcRect/>
-          <a:stretch>
-            <a:fillRect/>
-          </a:stretch>
-        </a:blipFill>
-        <a:effectLst/>
-      </p:bgPr>
-    </p:bg>
     <p:spTree>
       <p:nvGrpSpPr>
         <p:cNvPr id="1" name=""/>
@@ -23986,7 +23343,7 @@
                     </a:schemeClr>
                   </a:solidFill>
                 </a:rPr>
-                <a:t>  WriteLine(</a:t>
+                <a:t>    WriteLine(</a:t>
               </a:r>
               <a:r>
                 <a:rPr lang="en-AU" sz="1600" dirty="0" err="1">
@@ -24016,7 +23373,7 @@
               </a:pPr>
               <a:r>
                 <a:rPr lang="en-AU" sz="1600" dirty="0"/>
-                <a:t>  </a:t>
+                <a:t>    </a:t>
               </a:r>
               <a:r>
                 <a:rPr lang="en-AU" sz="1600" dirty="0" err="1"/>
@@ -24081,7 +23438,7 @@
               <p:nvPr/>
             </p:nvPicPr>
             <p:blipFill>
-              <a:blip r:embed="rId3">
+              <a:blip r:embed="rId2">
                 <a:alphaModFix amt="30000"/>
               </a:blip>
               <a:stretch>
@@ -25920,7 +25277,7 @@
             <p:nvPr/>
           </p:nvPicPr>
           <p:blipFill>
-            <a:blip r:embed="rId4">
+            <a:blip r:embed="rId3">
               <a:alphaModFix amt="30000"/>
             </a:blip>
             <a:stretch>
@@ -26831,20 +26188,6 @@
 <file path=ppt/slides/slide7.xml><?xml version="1.0" encoding="utf-8"?>
 <p:sld xmlns:a="http://schemas.openxmlformats.org/drawingml/2006/main" xmlns:r="http://schemas.openxmlformats.org/officeDocument/2006/relationships" xmlns:p="http://schemas.openxmlformats.org/presentationml/2006/main">
   <p:cSld>
-    <p:bg>
-      <p:bgPr>
-        <a:blipFill dpi="0" rotWithShape="1">
-          <a:blip r:embed="rId2">
-            <a:lum/>
-          </a:blip>
-          <a:srcRect/>
-          <a:stretch>
-            <a:fillRect/>
-          </a:stretch>
-        </a:blipFill>
-        <a:effectLst/>
-      </p:bgPr>
-    </p:bg>
     <p:spTree>
       <p:nvGrpSpPr>
         <p:cNvPr id="1" name=""/>
@@ -27002,7 +26345,7 @@
                     </a:schemeClr>
                   </a:solidFill>
                 </a:rPr>
-                <a:t>  WriteLine(</a:t>
+                <a:t>    WriteLine(</a:t>
               </a:r>
               <a:r>
                 <a:rPr lang="en-AU" sz="1600" dirty="0" err="1">
@@ -27038,7 +26381,7 @@
                     </a:schemeClr>
                   </a:solidFill>
                 </a:rPr>
-                <a:t>  </a:t>
+                <a:t>    </a:t>
               </a:r>
               <a:r>
                 <a:rPr lang="en-AU" sz="1600" dirty="0" err="1">
@@ -27115,7 +26458,7 @@
               <p:nvPr/>
             </p:nvPicPr>
             <p:blipFill>
-              <a:blip r:embed="rId3">
+              <a:blip r:embed="rId2">
                 <a:alphaModFix amt="30000"/>
               </a:blip>
               <a:stretch>
@@ -28909,7 +28252,7 @@
             <p:nvPr/>
           </p:nvPicPr>
           <p:blipFill>
-            <a:blip r:embed="rId4">
+            <a:blip r:embed="rId3">
               <a:alphaModFix amt="30000"/>
             </a:blip>
             <a:stretch>
@@ -29712,20 +29055,6 @@
 <file path=ppt/slides/slide8.xml><?xml version="1.0" encoding="utf-8"?>
 <p:sld xmlns:a="http://schemas.openxmlformats.org/drawingml/2006/main" xmlns:r="http://schemas.openxmlformats.org/officeDocument/2006/relationships" xmlns:p="http://schemas.openxmlformats.org/presentationml/2006/main">
   <p:cSld>
-    <p:bg>
-      <p:bgPr>
-        <a:blipFill dpi="0" rotWithShape="1">
-          <a:blip r:embed="rId2">
-            <a:lum/>
-          </a:blip>
-          <a:srcRect/>
-          <a:stretch>
-            <a:fillRect/>
-          </a:stretch>
-        </a:blipFill>
-        <a:effectLst/>
-      </p:bgPr>
-    </p:bg>
     <p:spTree>
       <p:nvGrpSpPr>
         <p:cNvPr id="1" name=""/>
@@ -29895,7 +29224,7 @@
               </a:pPr>
               <a:r>
                 <a:rPr lang="en-AU" sz="1600" dirty="0"/>
-                <a:t>  WriteLine(</a:t>
+                <a:t>    WriteLine(</a:t>
               </a:r>
               <a:r>
                 <a:rPr lang="en-AU" sz="1600" dirty="0" err="1"/>
@@ -29919,7 +29248,7 @@
                     </a:schemeClr>
                   </a:solidFill>
                 </a:rPr>
-                <a:t>  </a:t>
+                <a:t>    </a:t>
               </a:r>
               <a:r>
                 <a:rPr lang="en-AU" sz="1600" dirty="0" err="1">
@@ -29995,7 +29324,7 @@
               <p:nvPr/>
             </p:nvPicPr>
             <p:blipFill>
-              <a:blip r:embed="rId3">
+              <a:blip r:embed="rId2">
                 <a:alphaModFix amt="30000"/>
               </a:blip>
               <a:stretch>
@@ -31832,7 +31161,7 @@
             <p:nvPr/>
           </p:nvPicPr>
           <p:blipFill>
-            <a:blip r:embed="rId4">
+            <a:blip r:embed="rId3">
               <a:alphaModFix amt="30000"/>
             </a:blip>
             <a:stretch>
@@ -32630,20 +31959,6 @@
 <file path=ppt/slides/slide9.xml><?xml version="1.0" encoding="utf-8"?>
 <p:sld xmlns:a="http://schemas.openxmlformats.org/drawingml/2006/main" xmlns:r="http://schemas.openxmlformats.org/officeDocument/2006/relationships" xmlns:p="http://schemas.openxmlformats.org/presentationml/2006/main">
   <p:cSld>
-    <p:bg>
-      <p:bgPr>
-        <a:blipFill dpi="0" rotWithShape="1">
-          <a:blip r:embed="rId2">
-            <a:lum/>
-          </a:blip>
-          <a:srcRect/>
-          <a:stretch>
-            <a:fillRect/>
-          </a:stretch>
-        </a:blipFill>
-        <a:effectLst/>
-      </p:bgPr>
-    </p:bg>
     <p:spTree>
       <p:nvGrpSpPr>
         <p:cNvPr id="1" name=""/>
@@ -32672,7 +31987,7 @@
         </p:nvGrpSpPr>
         <p:grpSpPr>
           <a:xfrm>
-            <a:off x="229043" y="371219"/>
+            <a:off x="229043" y="221589"/>
             <a:ext cx="7101587" cy="4685065"/>
             <a:chOff x="231271" y="-2890187"/>
             <a:chExt cx="7101587" cy="4685065"/>
@@ -32819,7 +32134,7 @@
                     </a:schemeClr>
                   </a:solidFill>
                 </a:rPr>
-                <a:t>  WriteLine(</a:t>
+                <a:t>    WriteLine(</a:t>
               </a:r>
               <a:r>
                 <a:rPr lang="en-AU" sz="1600" dirty="0" err="1">
@@ -32849,7 +32164,7 @@
               </a:pPr>
               <a:r>
                 <a:rPr lang="en-AU" sz="1600" dirty="0"/>
-                <a:t>  </a:t>
+                <a:t>    </a:t>
               </a:r>
               <a:r>
                 <a:rPr lang="en-AU" sz="1600" dirty="0" err="1"/>
@@ -32914,7 +32229,7 @@
               <p:nvPr/>
             </p:nvPicPr>
             <p:blipFill>
-              <a:blip r:embed="rId3">
+              <a:blip r:embed="rId2">
                 <a:alphaModFix amt="30000"/>
               </a:blip>
               <a:stretch>
@@ -34734,7 +34049,7 @@
             <p:nvPr/>
           </p:nvPicPr>
           <p:blipFill>
-            <a:blip r:embed="rId4">
+            <a:blip r:embed="rId3">
               <a:alphaModFix amt="30000"/>
             </a:blip>
             <a:stretch>
@@ -34803,7 +34118,7 @@
         </p:nvGrpSpPr>
         <p:grpSpPr>
           <a:xfrm>
-            <a:off x="1912319" y="2088681"/>
+            <a:off x="1912319" y="1939051"/>
             <a:ext cx="407468" cy="1677227"/>
             <a:chOff x="1668759" y="-13958058"/>
             <a:chExt cx="487848" cy="22198517"/>
@@ -34922,7 +34237,7 @@
         </p:nvGrpSpPr>
         <p:grpSpPr>
           <a:xfrm>
-            <a:off x="325682" y="1650882"/>
+            <a:off x="325682" y="1501252"/>
             <a:ext cx="1503543" cy="692460"/>
             <a:chOff x="325682" y="1650882"/>
             <a:chExt cx="1503543" cy="692460"/>
@@ -35183,7 +34498,7 @@
         </p:nvGrpSpPr>
         <p:grpSpPr>
           <a:xfrm>
-            <a:off x="295207" y="2308383"/>
+            <a:off x="295207" y="2158753"/>
             <a:ext cx="1503543" cy="682835"/>
             <a:chOff x="295207" y="2308383"/>
             <a:chExt cx="1503543" cy="682835"/>
@@ -35459,7 +34774,7 @@
         </p:nvCxnSpPr>
         <p:spPr>
           <a:xfrm>
-            <a:off x="986944" y="2165884"/>
+            <a:off x="986944" y="2016254"/>
             <a:ext cx="298436" cy="12702"/>
           </a:xfrm>
           <a:prstGeom prst="curvedConnector3">
@@ -35508,7 +34823,7 @@
         </p:nvCxnSpPr>
         <p:spPr>
           <a:xfrm>
-            <a:off x="581085" y="2164278"/>
+            <a:off x="581085" y="2014648"/>
             <a:ext cx="298436" cy="12702"/>
           </a:xfrm>
           <a:prstGeom prst="curvedConnector3">
@@ -35555,7 +34870,7 @@
         </p:nvSpPr>
         <p:spPr>
           <a:xfrm>
-            <a:off x="1304634" y="1989039"/>
+            <a:off x="1304634" y="1839409"/>
             <a:ext cx="543099" cy="369332"/>
           </a:xfrm>
           <a:prstGeom prst="rect">
@@ -35590,7 +34905,7 @@
         </p:nvSpPr>
         <p:spPr>
           <a:xfrm>
-            <a:off x="3346926" y="3762484"/>
+            <a:off x="3346926" y="3612854"/>
             <a:ext cx="3971192" cy="923330"/>
           </a:xfrm>
           <a:prstGeom prst="rect">
@@ -35657,7 +34972,7 @@
         </p:nvCxnSpPr>
         <p:spPr>
           <a:xfrm flipV="1">
-            <a:off x="3490928" y="4682163"/>
+            <a:off x="3490928" y="4532533"/>
             <a:ext cx="0" cy="155924"/>
           </a:xfrm>
           <a:prstGeom prst="line">

</xml_diff>